<commit_message>
Added pics, changed poster
</commit_message>
<xml_diff>
--- a/TSI_Poster.pptx
+++ b/TSI_Poster.pptx
@@ -6098,11 +6098,7 @@
           <a:p>
             <a:r>
               <a:rPr lang="en-US" sz="1100" dirty="0" smtClean="0"/>
-              <a:t>Engineers: </a:t>
-            </a:r>
-            <a:r>
-              <a:rPr lang="en-US" sz="1100" dirty="0" smtClean="0"/>
-              <a:t>Jack Plumb, Adam Ness, </a:t>
+              <a:t>Engineers: Jack Plumb, Adam Ness, </a:t>
             </a:r>
             <a:r>
               <a:rPr lang="en-US" sz="1100" dirty="0" err="1" smtClean="0"/>
@@ -6132,7 +6128,7 @@
         <p:spPr>
           <a:xfrm>
             <a:off x="152400" y="1143000"/>
-            <a:ext cx="2529203" cy="2819400"/>
+            <a:ext cx="2869096" cy="2819400"/>
           </a:xfrm>
           <a:prstGeom prst="rect">
             <a:avLst/>
@@ -6171,108 +6167,6 @@
       </p:sp>
       <p:sp>
         <p:nvSpPr>
-          <p:cNvPr id="11" name="TextBox 10"/>
-          <p:cNvSpPr txBox="1"/>
-          <p:nvPr/>
-        </p:nvSpPr>
-        <p:spPr>
-          <a:xfrm>
-            <a:off x="152400" y="1143000"/>
-            <a:ext cx="2529203" cy="2369880"/>
-          </a:xfrm>
-          <a:prstGeom prst="rect">
-            <a:avLst/>
-          </a:prstGeom>
-          <a:noFill/>
-          <a:ln>
-            <a:noFill/>
-          </a:ln>
-        </p:spPr>
-        <p:txBody>
-          <a:bodyPr wrap="square" rtlCol="0">
-            <a:spAutoFit/>
-          </a:bodyPr>
-          <a:lstStyle/>
-          <a:p>
-            <a:r>
-              <a:rPr lang="en-US" dirty="0"/>
-              <a:t>Functionality</a:t>
-            </a:r>
-          </a:p>
-          <a:p>
-            <a:pPr marL="285750" indent="-285750">
-              <a:buFont typeface="Arial" panose="020B0604020202020204" pitchFamily="34" charset="0"/>
-              <a:buChar char="•"/>
-            </a:pPr>
-            <a:r>
-              <a:rPr lang="en-US" sz="1400" dirty="0" smtClean="0"/>
-              <a:t>Throttle Plausibility</a:t>
-            </a:r>
-            <a:endParaRPr lang="en-US" sz="1400" dirty="0"/>
-          </a:p>
-          <a:p>
-            <a:pPr marL="285750" indent="-285750">
-              <a:buFont typeface="Arial" panose="020B0604020202020204" pitchFamily="34" charset="0"/>
-              <a:buChar char="•"/>
-            </a:pPr>
-            <a:r>
-              <a:rPr lang="en-US" sz="1400" dirty="0" smtClean="0"/>
-              <a:t>Brake Interface</a:t>
-            </a:r>
-            <a:endParaRPr lang="en-US" sz="1400" dirty="0"/>
-          </a:p>
-          <a:p>
-            <a:pPr marL="285750" indent="-285750">
-              <a:buFont typeface="Arial" panose="020B0604020202020204" pitchFamily="34" charset="0"/>
-              <a:buChar char="•"/>
-            </a:pPr>
-            <a:r>
-              <a:rPr lang="en-US" sz="1400" dirty="0"/>
-              <a:t>Voltage/Current Measurement</a:t>
-            </a:r>
-          </a:p>
-          <a:p>
-            <a:pPr marL="285750" indent="-285750">
-              <a:buFont typeface="Arial" panose="020B0604020202020204" pitchFamily="34" charset="0"/>
-              <a:buChar char="•"/>
-            </a:pPr>
-            <a:r>
-              <a:rPr lang="en-US" sz="1400" dirty="0"/>
-              <a:t>Motor Controller Interface</a:t>
-            </a:r>
-          </a:p>
-          <a:p>
-            <a:pPr marL="285750" indent="-285750">
-              <a:buFont typeface="Arial" panose="020B0604020202020204" pitchFamily="34" charset="0"/>
-              <a:buChar char="•"/>
-            </a:pPr>
-            <a:r>
-              <a:rPr lang="en-US" sz="1400" dirty="0"/>
-              <a:t>Drive </a:t>
-            </a:r>
-            <a:r>
-              <a:rPr lang="en-US" sz="1400" dirty="0" smtClean="0"/>
-              <a:t>State</a:t>
-            </a:r>
-            <a:endParaRPr lang="en-US" sz="1400" dirty="0"/>
-          </a:p>
-          <a:p>
-            <a:pPr marL="285750" indent="-285750">
-              <a:buFont typeface="Arial" panose="020B0604020202020204" pitchFamily="34" charset="0"/>
-              <a:buChar char="•"/>
-            </a:pPr>
-            <a:r>
-              <a:rPr lang="en-US" sz="1400" dirty="0"/>
-              <a:t>Insulation Monitoring Device</a:t>
-            </a:r>
-          </a:p>
-          <a:p>
-            <a:endParaRPr lang="en-US" dirty="0"/>
-          </a:p>
-        </p:txBody>
-      </p:sp>
-      <p:sp>
-        <p:nvSpPr>
           <p:cNvPr id="12" name="Rectangle 11"/>
           <p:cNvSpPr/>
           <p:nvPr/>
@@ -6280,7 +6174,7 @@
         <p:spPr>
           <a:xfrm>
             <a:off x="152400" y="4120515"/>
-            <a:ext cx="2538728" cy="2508885"/>
+            <a:ext cx="2869096" cy="2508885"/>
           </a:xfrm>
           <a:prstGeom prst="rect">
             <a:avLst/>
@@ -6319,44 +6213,14 @@
       </p:sp>
       <p:sp>
         <p:nvSpPr>
-          <p:cNvPr id="13" name="TextBox 12"/>
-          <p:cNvSpPr txBox="1"/>
-          <p:nvPr/>
-        </p:nvSpPr>
-        <p:spPr>
-          <a:xfrm>
-            <a:off x="152400" y="4120515"/>
-            <a:ext cx="2538728" cy="369332"/>
-          </a:xfrm>
-          <a:prstGeom prst="rect">
-            <a:avLst/>
-          </a:prstGeom>
-          <a:noFill/>
-        </p:spPr>
-        <p:txBody>
-          <a:bodyPr wrap="square" rtlCol="0">
-            <a:spAutoFit/>
-          </a:bodyPr>
-          <a:lstStyle/>
-          <a:p>
-            <a:r>
-              <a:rPr lang="en-US" dirty="0" smtClean="0"/>
-              <a:t>Final Product</a:t>
-            </a:r>
-            <a:endParaRPr lang="en-US" dirty="0"/>
-          </a:p>
-        </p:txBody>
-      </p:sp>
-      <p:sp>
-        <p:nvSpPr>
           <p:cNvPr id="14" name="Rectangle 13"/>
           <p:cNvSpPr/>
           <p:nvPr/>
         </p:nvSpPr>
         <p:spPr>
           <a:xfrm>
-            <a:off x="2767643" y="1143000"/>
-            <a:ext cx="3709357" cy="3581400"/>
+            <a:off x="3158973" y="1143000"/>
+            <a:ext cx="3318027" cy="2819400"/>
           </a:xfrm>
           <a:prstGeom prst="rect">
             <a:avLst/>
@@ -6401,8 +6265,8 @@
         </p:nvSpPr>
         <p:spPr>
           <a:xfrm>
-            <a:off x="2853367" y="1143000"/>
-            <a:ext cx="3537908" cy="1015663"/>
+            <a:off x="319403" y="1208694"/>
+            <a:ext cx="2438400" cy="861774"/>
           </a:xfrm>
           <a:prstGeom prst="rect">
             <a:avLst/>
@@ -6416,16 +6280,50 @@
           <a:lstStyle/>
           <a:p>
             <a:r>
-              <a:rPr lang="en-US" dirty="0" smtClean="0"/>
+              <a:rPr lang="en-US" sz="1000" dirty="0" smtClean="0"/>
               <a:t>Overview</a:t>
             </a:r>
           </a:p>
           <a:p>
             <a:r>
-              <a:rPr lang="en-US" sz="1400" dirty="0" smtClean="0"/>
-              <a:t>The Tractive System Interface is designed to safely connect the high voltage from the packs to the motor controller.</a:t>
-            </a:r>
-            <a:endParaRPr lang="en-US" sz="1400" dirty="0"/>
+              <a:rPr lang="en-US" sz="800" dirty="0" smtClean="0"/>
+              <a:t>The overall goal of the </a:t>
+            </a:r>
+            <a:r>
+              <a:rPr lang="en-US" sz="800" dirty="0" smtClean="0"/>
+              <a:t>Tractive System Interface is </a:t>
+            </a:r>
+            <a:r>
+              <a:rPr lang="en-US" sz="800" dirty="0" smtClean="0"/>
+              <a:t>to </a:t>
+            </a:r>
+            <a:r>
+              <a:rPr lang="en-US" sz="800" dirty="0" smtClean="0"/>
+              <a:t>safely connect </a:t>
+            </a:r>
+            <a:r>
+              <a:rPr lang="en-US" sz="800" dirty="0" smtClean="0"/>
+              <a:t>high </a:t>
+            </a:r>
+            <a:r>
+              <a:rPr lang="en-US" sz="800" dirty="0" smtClean="0"/>
+              <a:t>voltage from the packs to the motor </a:t>
+            </a:r>
+            <a:r>
+              <a:rPr lang="en-US" sz="800" dirty="0" smtClean="0"/>
+              <a:t>controller.</a:t>
+            </a:r>
+            <a:r>
+              <a:rPr lang="en-US" sz="800" dirty="0" smtClean="0"/>
+              <a:t> </a:t>
+            </a:r>
+            <a:endParaRPr lang="en-US" sz="800" dirty="0" smtClean="0"/>
+          </a:p>
+          <a:p>
+            <a:endParaRPr lang="en-US" sz="800" dirty="0"/>
+          </a:p>
+          <a:p>
+            <a:endParaRPr lang="en-US" sz="800" dirty="0"/>
           </a:p>
         </p:txBody>
       </p:sp>
@@ -6437,8 +6335,8 @@
         </p:nvSpPr>
         <p:spPr>
           <a:xfrm>
-            <a:off x="2767643" y="4882515"/>
-            <a:ext cx="3709357" cy="1746885"/>
+            <a:off x="3158973" y="4114799"/>
+            <a:ext cx="3318027" cy="2514601"/>
           </a:xfrm>
           <a:prstGeom prst="rect">
             <a:avLst/>
@@ -6483,8 +6381,8 @@
         </p:nvSpPr>
         <p:spPr>
           <a:xfrm>
-            <a:off x="2767643" y="4882515"/>
-            <a:ext cx="2629530" cy="369332"/>
+            <a:off x="3172770" y="4197536"/>
+            <a:ext cx="2629530" cy="246221"/>
           </a:xfrm>
           <a:prstGeom prst="rect">
             <a:avLst/>
@@ -6498,10 +6396,10 @@
           <a:lstStyle/>
           <a:p>
             <a:r>
-              <a:rPr lang="en-US" dirty="0" smtClean="0"/>
-              <a:t>Test Panel</a:t>
-            </a:r>
-            <a:endParaRPr lang="en-US" dirty="0"/>
+              <a:rPr lang="en-US" sz="1000" dirty="0" smtClean="0"/>
+              <a:t>Testing and Integration</a:t>
+            </a:r>
+            <a:endParaRPr lang="en-US" sz="1000" dirty="0"/>
           </a:p>
         </p:txBody>
       </p:sp>
@@ -6514,7 +6412,7 @@
         <p:spPr>
           <a:xfrm>
             <a:off x="6562724" y="1141927"/>
-            <a:ext cx="2457451" cy="4109919"/>
+            <a:ext cx="2457451" cy="1996834"/>
           </a:xfrm>
           <a:prstGeom prst="rect">
             <a:avLst/>
@@ -6559,8 +6457,8 @@
         </p:nvSpPr>
         <p:spPr>
           <a:xfrm>
-            <a:off x="6648449" y="1143000"/>
-            <a:ext cx="2191382" cy="800219"/>
+            <a:off x="228600" y="4246603"/>
+            <a:ext cx="2191382" cy="369332"/>
           </a:xfrm>
           <a:prstGeom prst="rect">
             <a:avLst/>
@@ -6574,16 +6472,20 @@
           <a:lstStyle/>
           <a:p>
             <a:r>
-              <a:rPr lang="en-US" dirty="0" smtClean="0"/>
+              <a:rPr lang="en-US" sz="1000" dirty="0" smtClean="0"/>
               <a:t>PCB</a:t>
             </a:r>
           </a:p>
           <a:p>
             <a:r>
-              <a:rPr lang="en-US" sz="1400" dirty="0" smtClean="0"/>
-              <a:t>Worked at one point, now everything's fucked</a:t>
-            </a:r>
-            <a:endParaRPr lang="en-US" sz="1400" dirty="0"/>
+              <a:rPr lang="en-US" sz="800" dirty="0" smtClean="0"/>
+              <a:t>The PCB was designed </a:t>
+            </a:r>
+            <a:r>
+              <a:rPr lang="en-US" sz="800" smtClean="0"/>
+              <a:t>to monitor the </a:t>
+            </a:r>
+            <a:endParaRPr lang="en-US" sz="800" dirty="0"/>
           </a:p>
         </p:txBody>
       </p:sp>
@@ -6898,8 +6800,8 @@
         </p:blipFill>
         <p:spPr>
           <a:xfrm>
-            <a:off x="2828925" y="5486400"/>
-            <a:ext cx="3571875" cy="795850"/>
+            <a:off x="2848606" y="6198505"/>
+            <a:ext cx="1590676" cy="354418"/>
           </a:xfrm>
           <a:prstGeom prst="rect">
             <a:avLst/>
@@ -6927,8 +6829,8 @@
         </p:blipFill>
         <p:spPr>
           <a:xfrm>
-            <a:off x="6650508" y="3512881"/>
-            <a:ext cx="2311286" cy="1684862"/>
+            <a:off x="504154" y="5583997"/>
+            <a:ext cx="912848" cy="665440"/>
           </a:xfrm>
           <a:prstGeom prst="rect">
             <a:avLst/>
@@ -6956,8 +6858,8 @@
         </p:blipFill>
         <p:spPr>
           <a:xfrm>
-            <a:off x="457200" y="4530275"/>
-            <a:ext cx="1828800" cy="1977813"/>
+            <a:off x="4371750" y="5351643"/>
+            <a:ext cx="762000" cy="824088"/>
           </a:xfrm>
           <a:prstGeom prst="rect">
             <a:avLst/>
@@ -6986,14 +6888,376 @@
         </p:blipFill>
         <p:spPr>
           <a:xfrm>
-            <a:off x="3136190" y="2127885"/>
-            <a:ext cx="3003618" cy="2489300"/>
+            <a:off x="530074" y="2318156"/>
+            <a:ext cx="1451814" cy="1203216"/>
           </a:xfrm>
           <a:prstGeom prst="rect">
             <a:avLst/>
           </a:prstGeom>
         </p:spPr>
       </p:pic>
+      <p:sp>
+        <p:nvSpPr>
+          <p:cNvPr id="27" name="Rectangle 26"/>
+          <p:cNvSpPr/>
+          <p:nvPr/>
+        </p:nvSpPr>
+        <p:spPr>
+          <a:xfrm>
+            <a:off x="6557423" y="3308039"/>
+            <a:ext cx="2457451" cy="1958815"/>
+          </a:xfrm>
+          <a:prstGeom prst="rect">
+            <a:avLst/>
+          </a:prstGeom>
+          <a:noFill/>
+          <a:ln>
+            <a:solidFill>
+              <a:srgbClr val="9B3937"/>
+            </a:solidFill>
+          </a:ln>
+        </p:spPr>
+        <p:style>
+          <a:lnRef idx="2">
+            <a:schemeClr val="accent1">
+              <a:shade val="50000"/>
+            </a:schemeClr>
+          </a:lnRef>
+          <a:fillRef idx="1">
+            <a:schemeClr val="accent1"/>
+          </a:fillRef>
+          <a:effectRef idx="0">
+            <a:schemeClr val="accent1"/>
+          </a:effectRef>
+          <a:fontRef idx="minor">
+            <a:schemeClr val="lt1"/>
+          </a:fontRef>
+        </p:style>
+        <p:txBody>
+          <a:bodyPr rtlCol="0" anchor="ctr"/>
+          <a:lstStyle/>
+          <a:p>
+            <a:pPr algn="ctr"/>
+            <a:endParaRPr lang="en-US"/>
+          </a:p>
+        </p:txBody>
+      </p:sp>
+      <p:sp>
+        <p:nvSpPr>
+          <p:cNvPr id="29" name="TextBox 28"/>
+          <p:cNvSpPr txBox="1"/>
+          <p:nvPr/>
+        </p:nvSpPr>
+        <p:spPr>
+          <a:xfrm>
+            <a:off x="6600185" y="3581983"/>
+            <a:ext cx="2353953" cy="861774"/>
+          </a:xfrm>
+          <a:prstGeom prst="rect">
+            <a:avLst/>
+          </a:prstGeom>
+          <a:noFill/>
+        </p:spPr>
+        <p:txBody>
+          <a:bodyPr wrap="square" rtlCol="0">
+            <a:spAutoFit/>
+          </a:bodyPr>
+          <a:lstStyle/>
+          <a:p>
+            <a:r>
+              <a:rPr lang="en-US" sz="1000" dirty="0" smtClean="0"/>
+              <a:t>The Team</a:t>
+            </a:r>
+            <a:endParaRPr lang="en-US" sz="1000" dirty="0" smtClean="0"/>
+          </a:p>
+          <a:p>
+            <a:r>
+              <a:rPr lang="en-US" sz="800" dirty="0" smtClean="0"/>
+              <a:t>The Tractive System Interface </a:t>
+            </a:r>
+            <a:r>
+              <a:rPr lang="en-US" sz="800" dirty="0" smtClean="0"/>
+              <a:t>consisted of somewhat working components, and hardly working team members, fueled mainly with the promise of breakfast pastries and low priced beers at the local tavern.</a:t>
+            </a:r>
+            <a:endParaRPr lang="en-US" sz="800" dirty="0"/>
+          </a:p>
+        </p:txBody>
+      </p:sp>
+      <p:pic>
+        <p:nvPicPr>
+          <p:cNvPr id="1028" name="Picture 4" descr="https://lh3.googleusercontent.com/DNLVQ0rt6GJYIBiqKomNUXEHjWrgFTRsTaE3hX6Z6K8QOxB0LolL1S2axfdboen48kbKxJENsUlZZXhcaJwd7nZjdyjJJ6SO28NVkKbLoa6uVTHMz54SMNcP1ffX2Y2pfRptZ2NnB94"/>
+          <p:cNvPicPr>
+            <a:picLocks noChangeAspect="1" noChangeArrowheads="1"/>
+          </p:cNvPicPr>
+          <p:nvPr/>
+        </p:nvPicPr>
+        <p:blipFill rotWithShape="1">
+          <a:blip r:embed="rId8" cstate="print">
+            <a:extLst>
+              <a:ext uri="{28A0092B-C50C-407E-A947-70E740481C1C}">
+                <a14:useLocalDpi xmlns:a14="http://schemas.microsoft.com/office/drawing/2010/main" val="0"/>
+              </a:ext>
+            </a:extLst>
+          </a:blip>
+          <a:srcRect l="10588" r="14118"/>
+          <a:stretch/>
+        </p:blipFill>
+        <p:spPr bwMode="auto">
+          <a:xfrm>
+            <a:off x="7162800" y="2142737"/>
+            <a:ext cx="1219200" cy="897315"/>
+          </a:xfrm>
+          <a:prstGeom prst="rect">
+            <a:avLst/>
+          </a:prstGeom>
+          <a:noFill/>
+          <a:extLst>
+            <a:ext uri="{909E8E84-426E-40DD-AFC4-6F175D3DCCD1}">
+              <a14:hiddenFill xmlns:a14="http://schemas.microsoft.com/office/drawing/2010/main">
+                <a:solidFill>
+                  <a:srgbClr val="FFFFFF"/>
+                </a:solidFill>
+              </a14:hiddenFill>
+            </a:ext>
+          </a:extLst>
+        </p:spPr>
+      </p:pic>
+      <p:sp>
+        <p:nvSpPr>
+          <p:cNvPr id="30" name="TextBox 29"/>
+          <p:cNvSpPr txBox="1"/>
+          <p:nvPr/>
+        </p:nvSpPr>
+        <p:spPr>
+          <a:xfrm>
+            <a:off x="6609171" y="1184483"/>
+            <a:ext cx="2353953" cy="984885"/>
+          </a:xfrm>
+          <a:prstGeom prst="rect">
+            <a:avLst/>
+          </a:prstGeom>
+          <a:noFill/>
+        </p:spPr>
+        <p:txBody>
+          <a:bodyPr wrap="square" rtlCol="0">
+            <a:spAutoFit/>
+          </a:bodyPr>
+          <a:lstStyle/>
+          <a:p>
+            <a:r>
+              <a:rPr lang="en-US" sz="1000" dirty="0" smtClean="0"/>
+              <a:t>Enclosure</a:t>
+            </a:r>
+          </a:p>
+          <a:p>
+            <a:r>
+              <a:rPr lang="en-US" sz="800" dirty="0" smtClean="0"/>
+              <a:t>The TSI Enclosure was designed to neatly house all systems </a:t>
+            </a:r>
+            <a:r>
+              <a:rPr lang="en-US" sz="800" dirty="0" smtClean="0"/>
+              <a:t>needed to safely operate the vehicle. Electric insulation was needed to protect the parts from the metal walls. Panels were fabricated separately to allow for adaptability if new ports were needed.</a:t>
+            </a:r>
+            <a:endParaRPr lang="en-US" sz="800" dirty="0" smtClean="0"/>
+          </a:p>
+        </p:txBody>
+      </p:sp>
+      <p:pic>
+        <p:nvPicPr>
+          <p:cNvPr id="9" name="Picture 8"/>
+          <p:cNvPicPr>
+            <a:picLocks noChangeAspect="1"/>
+          </p:cNvPicPr>
+          <p:nvPr/>
+        </p:nvPicPr>
+        <p:blipFill>
+          <a:blip r:embed="rId9" cstate="print">
+            <a:extLst>
+              <a:ext uri="{28A0092B-C50C-407E-A947-70E740481C1C}">
+                <a14:useLocalDpi xmlns:a14="http://schemas.microsoft.com/office/drawing/2010/main" val="0"/>
+              </a:ext>
+            </a:extLst>
+          </a:blip>
+          <a:stretch>
+            <a:fillRect/>
+          </a:stretch>
+        </p:blipFill>
+        <p:spPr>
+          <a:xfrm>
+            <a:off x="4809002" y="3010654"/>
+            <a:ext cx="1455976" cy="904944"/>
+          </a:xfrm>
+          <a:prstGeom prst="rect">
+            <a:avLst/>
+          </a:prstGeom>
+        </p:spPr>
+      </p:pic>
+      <p:sp>
+        <p:nvSpPr>
+          <p:cNvPr id="32" name="TextBox 31"/>
+          <p:cNvSpPr txBox="1"/>
+          <p:nvPr/>
+        </p:nvSpPr>
+        <p:spPr>
+          <a:xfrm>
+            <a:off x="3205200" y="1208694"/>
+            <a:ext cx="1963668" cy="1600438"/>
+          </a:xfrm>
+          <a:prstGeom prst="rect">
+            <a:avLst/>
+          </a:prstGeom>
+          <a:noFill/>
+        </p:spPr>
+        <p:txBody>
+          <a:bodyPr wrap="square" rtlCol="0">
+            <a:spAutoFit/>
+          </a:bodyPr>
+          <a:lstStyle/>
+          <a:p>
+            <a:pPr lvl="0"/>
+            <a:r>
+              <a:rPr lang="en-US" sz="1000" dirty="0" smtClean="0">
+                <a:solidFill>
+                  <a:prstClr val="black"/>
+                </a:solidFill>
+              </a:rPr>
+              <a:t>Functionality</a:t>
+            </a:r>
+          </a:p>
+          <a:p>
+            <a:pPr lvl="0"/>
+            <a:r>
+              <a:rPr lang="en-US" sz="800" dirty="0" smtClean="0">
+                <a:solidFill>
+                  <a:prstClr val="black"/>
+                </a:solidFill>
+              </a:rPr>
+              <a:t>The system was designed to facilitate a number of other functions based upon rules described by FSAE. </a:t>
+            </a:r>
+          </a:p>
+          <a:p>
+            <a:pPr lvl="0"/>
+            <a:endParaRPr lang="en-US" sz="800" dirty="0" smtClean="0">
+              <a:solidFill>
+                <a:prstClr val="black"/>
+              </a:solidFill>
+            </a:endParaRPr>
+          </a:p>
+          <a:p>
+            <a:pPr lvl="0"/>
+            <a:r>
+              <a:rPr lang="en-US" sz="800" dirty="0" smtClean="0">
+                <a:solidFill>
+                  <a:prstClr val="black"/>
+                </a:solidFill>
+              </a:rPr>
+              <a:t>This included:</a:t>
+            </a:r>
+            <a:endParaRPr lang="en-US" sz="800" dirty="0">
+              <a:solidFill>
+                <a:prstClr val="black"/>
+              </a:solidFill>
+            </a:endParaRPr>
+          </a:p>
+          <a:p>
+            <a:pPr marL="285750" lvl="0" indent="-285750">
+              <a:buFont typeface="Arial" panose="020B0604020202020204" pitchFamily="34" charset="0"/>
+              <a:buChar char="•"/>
+            </a:pPr>
+            <a:r>
+              <a:rPr lang="en-US" sz="800" dirty="0">
+                <a:solidFill>
+                  <a:prstClr val="black"/>
+                </a:solidFill>
+              </a:rPr>
+              <a:t>Throttle Plausibility</a:t>
+            </a:r>
+          </a:p>
+          <a:p>
+            <a:pPr marL="285750" lvl="0" indent="-285750">
+              <a:buFont typeface="Arial" panose="020B0604020202020204" pitchFamily="34" charset="0"/>
+              <a:buChar char="•"/>
+            </a:pPr>
+            <a:r>
+              <a:rPr lang="en-US" sz="800" dirty="0">
+                <a:solidFill>
+                  <a:prstClr val="black"/>
+                </a:solidFill>
+              </a:rPr>
+              <a:t>Brake Interface</a:t>
+            </a:r>
+          </a:p>
+          <a:p>
+            <a:pPr marL="285750" lvl="0" indent="-285750">
+              <a:buFont typeface="Arial" panose="020B0604020202020204" pitchFamily="34" charset="0"/>
+              <a:buChar char="•"/>
+            </a:pPr>
+            <a:r>
+              <a:rPr lang="en-US" sz="800" dirty="0">
+                <a:solidFill>
+                  <a:prstClr val="black"/>
+                </a:solidFill>
+              </a:rPr>
+              <a:t>Voltage/Current Measurement</a:t>
+            </a:r>
+          </a:p>
+          <a:p>
+            <a:pPr marL="285750" lvl="0" indent="-285750">
+              <a:buFont typeface="Arial" panose="020B0604020202020204" pitchFamily="34" charset="0"/>
+              <a:buChar char="•"/>
+            </a:pPr>
+            <a:r>
+              <a:rPr lang="en-US" sz="800" dirty="0">
+                <a:solidFill>
+                  <a:prstClr val="black"/>
+                </a:solidFill>
+              </a:rPr>
+              <a:t>Motor Controller Interface</a:t>
+            </a:r>
+          </a:p>
+          <a:p>
+            <a:pPr marL="285750" lvl="0" indent="-285750">
+              <a:buFont typeface="Arial" panose="020B0604020202020204" pitchFamily="34" charset="0"/>
+              <a:buChar char="•"/>
+            </a:pPr>
+            <a:r>
+              <a:rPr lang="en-US" sz="800" dirty="0">
+                <a:solidFill>
+                  <a:prstClr val="black"/>
+                </a:solidFill>
+              </a:rPr>
+              <a:t>Drive State</a:t>
+            </a:r>
+          </a:p>
+          <a:p>
+            <a:pPr marL="285750" lvl="0" indent="-285750">
+              <a:buFont typeface="Arial" panose="020B0604020202020204" pitchFamily="34" charset="0"/>
+              <a:buChar char="•"/>
+            </a:pPr>
+            <a:r>
+              <a:rPr lang="en-US" sz="800" dirty="0">
+                <a:solidFill>
+                  <a:prstClr val="black"/>
+                </a:solidFill>
+              </a:rPr>
+              <a:t>Insulation Monitoring </a:t>
+            </a:r>
+            <a:r>
+              <a:rPr lang="en-US" sz="800" dirty="0" smtClean="0">
+                <a:solidFill>
+                  <a:prstClr val="black"/>
+                </a:solidFill>
+              </a:rPr>
+              <a:t>Device (IMD)</a:t>
+            </a:r>
+            <a:endParaRPr lang="en-US" sz="800" dirty="0">
+              <a:solidFill>
+                <a:prstClr val="black"/>
+              </a:solidFill>
+            </a:endParaRPr>
+          </a:p>
+        </p:txBody>
+      </p:sp>
     </p:spTree>
   </p:cSld>
   <p:clrMapOvr>

</xml_diff>

<commit_message>
Finished up first revision of the poster. Needs review.
</commit_message>
<xml_diff>
--- a/TSI_Poster.pptx
+++ b/TSI_Poster.pptx
@@ -5,6 +5,9 @@
     <p:sldMasterId id="2147483648" r:id="rId1"/>
     <p:sldMasterId id="2147483660" r:id="rId2"/>
   </p:sldMasterIdLst>
+  <p:notesMasterIdLst>
+    <p:notesMasterId r:id="rId4"/>
+  </p:notesMasterIdLst>
   <p:sldIdLst>
     <p:sldId id="256" r:id="rId3"/>
   </p:sldIdLst>
@@ -122,6 +125,440 @@
     </p:ext>
   </p:extLst>
 </p:presentation>
+</file>
+
+<file path=ppt/notesMasters/notesMaster1.xml><?xml version="1.0" encoding="utf-8"?>
+<p:notesMaster xmlns:a="http://schemas.openxmlformats.org/drawingml/2006/main" xmlns:r="http://schemas.openxmlformats.org/officeDocument/2006/relationships" xmlns:p="http://schemas.openxmlformats.org/presentationml/2006/main">
+  <p:cSld>
+    <p:bg>
+      <p:bgRef idx="1001">
+        <a:schemeClr val="bg1"/>
+      </p:bgRef>
+    </p:bg>
+    <p:spTree>
+      <p:nvGrpSpPr>
+        <p:cNvPr id="1" name=""/>
+        <p:cNvGrpSpPr/>
+        <p:nvPr/>
+      </p:nvGrpSpPr>
+      <p:grpSpPr>
+        <a:xfrm>
+          <a:off x="0" y="0"/>
+          <a:ext cx="0" cy="0"/>
+          <a:chOff x="0" y="0"/>
+          <a:chExt cx="0" cy="0"/>
+        </a:xfrm>
+      </p:grpSpPr>
+      <p:sp>
+        <p:nvSpPr>
+          <p:cNvPr id="2" name="Header Placeholder 1"/>
+          <p:cNvSpPr>
+            <a:spLocks noGrp="1"/>
+          </p:cNvSpPr>
+          <p:nvPr>
+            <p:ph type="hdr" sz="quarter"/>
+          </p:nvPr>
+        </p:nvSpPr>
+        <p:spPr>
+          <a:xfrm>
+            <a:off x="0" y="0"/>
+            <a:ext cx="2971800" cy="458788"/>
+          </a:xfrm>
+          <a:prstGeom prst="rect">
+            <a:avLst/>
+          </a:prstGeom>
+        </p:spPr>
+        <p:txBody>
+          <a:bodyPr vert="horz" lIns="91440" tIns="45720" rIns="91440" bIns="45720" rtlCol="0"/>
+          <a:lstStyle>
+            <a:lvl1pPr algn="l">
+              <a:defRPr sz="1200"/>
+            </a:lvl1pPr>
+          </a:lstStyle>
+          <a:p>
+            <a:endParaRPr lang="en-US"/>
+          </a:p>
+        </p:txBody>
+      </p:sp>
+      <p:sp>
+        <p:nvSpPr>
+          <p:cNvPr id="3" name="Date Placeholder 2"/>
+          <p:cNvSpPr>
+            <a:spLocks noGrp="1"/>
+          </p:cNvSpPr>
+          <p:nvPr>
+            <p:ph type="dt" idx="1"/>
+          </p:nvPr>
+        </p:nvSpPr>
+        <p:spPr>
+          <a:xfrm>
+            <a:off x="3884613" y="0"/>
+            <a:ext cx="2971800" cy="458788"/>
+          </a:xfrm>
+          <a:prstGeom prst="rect">
+            <a:avLst/>
+          </a:prstGeom>
+        </p:spPr>
+        <p:txBody>
+          <a:bodyPr vert="horz" lIns="91440" tIns="45720" rIns="91440" bIns="45720" rtlCol="0"/>
+          <a:lstStyle>
+            <a:lvl1pPr algn="r">
+              <a:defRPr sz="1200"/>
+            </a:lvl1pPr>
+          </a:lstStyle>
+          <a:p>
+            <a:fld id="{FF53A7D3-A5E6-4ABE-AFCF-408D358163A2}" type="datetimeFigureOut">
+              <a:rPr lang="en-US" smtClean="0"/>
+              <a:t>5/9/2017</a:t>
+            </a:fld>
+            <a:endParaRPr lang="en-US"/>
+          </a:p>
+        </p:txBody>
+      </p:sp>
+      <p:sp>
+        <p:nvSpPr>
+          <p:cNvPr id="4" name="Slide Image Placeholder 3"/>
+          <p:cNvSpPr>
+            <a:spLocks noGrp="1" noRot="1" noChangeAspect="1"/>
+          </p:cNvSpPr>
+          <p:nvPr>
+            <p:ph type="sldImg" idx="2"/>
+          </p:nvPr>
+        </p:nvSpPr>
+        <p:spPr>
+          <a:xfrm>
+            <a:off x="1371600" y="1143000"/>
+            <a:ext cx="4114800" cy="3086100"/>
+          </a:xfrm>
+          <a:prstGeom prst="rect">
+            <a:avLst/>
+          </a:prstGeom>
+          <a:noFill/>
+          <a:ln w="12700">
+            <a:solidFill>
+              <a:prstClr val="black"/>
+            </a:solidFill>
+          </a:ln>
+        </p:spPr>
+        <p:txBody>
+          <a:bodyPr vert="horz" lIns="91440" tIns="45720" rIns="91440" bIns="45720" rtlCol="0" anchor="ctr"/>
+          <a:lstStyle/>
+          <a:p>
+            <a:endParaRPr lang="en-US"/>
+          </a:p>
+        </p:txBody>
+      </p:sp>
+      <p:sp>
+        <p:nvSpPr>
+          <p:cNvPr id="5" name="Notes Placeholder 4"/>
+          <p:cNvSpPr>
+            <a:spLocks noGrp="1"/>
+          </p:cNvSpPr>
+          <p:nvPr>
+            <p:ph type="body" sz="quarter" idx="3"/>
+          </p:nvPr>
+        </p:nvSpPr>
+        <p:spPr>
+          <a:xfrm>
+            <a:off x="685800" y="4400550"/>
+            <a:ext cx="5486400" cy="3600450"/>
+          </a:xfrm>
+          <a:prstGeom prst="rect">
+            <a:avLst/>
+          </a:prstGeom>
+        </p:spPr>
+        <p:txBody>
+          <a:bodyPr vert="horz" lIns="91440" tIns="45720" rIns="91440" bIns="45720" rtlCol="0"/>
+          <a:lstStyle/>
+          <a:p>
+            <a:pPr lvl="0"/>
+            <a:r>
+              <a:rPr lang="en-US" smtClean="0"/>
+              <a:t>Click to edit Master text styles</a:t>
+            </a:r>
+          </a:p>
+          <a:p>
+            <a:pPr lvl="1"/>
+            <a:r>
+              <a:rPr lang="en-US" smtClean="0"/>
+              <a:t>Second level</a:t>
+            </a:r>
+          </a:p>
+          <a:p>
+            <a:pPr lvl="2"/>
+            <a:r>
+              <a:rPr lang="en-US" smtClean="0"/>
+              <a:t>Third level</a:t>
+            </a:r>
+          </a:p>
+          <a:p>
+            <a:pPr lvl="3"/>
+            <a:r>
+              <a:rPr lang="en-US" smtClean="0"/>
+              <a:t>Fourth level</a:t>
+            </a:r>
+          </a:p>
+          <a:p>
+            <a:pPr lvl="4"/>
+            <a:r>
+              <a:rPr lang="en-US" smtClean="0"/>
+              <a:t>Fifth level</a:t>
+            </a:r>
+            <a:endParaRPr lang="en-US"/>
+          </a:p>
+        </p:txBody>
+      </p:sp>
+      <p:sp>
+        <p:nvSpPr>
+          <p:cNvPr id="6" name="Footer Placeholder 5"/>
+          <p:cNvSpPr>
+            <a:spLocks noGrp="1"/>
+          </p:cNvSpPr>
+          <p:nvPr>
+            <p:ph type="ftr" sz="quarter" idx="4"/>
+          </p:nvPr>
+        </p:nvSpPr>
+        <p:spPr>
+          <a:xfrm>
+            <a:off x="0" y="8685213"/>
+            <a:ext cx="2971800" cy="458787"/>
+          </a:xfrm>
+          <a:prstGeom prst="rect">
+            <a:avLst/>
+          </a:prstGeom>
+        </p:spPr>
+        <p:txBody>
+          <a:bodyPr vert="horz" lIns="91440" tIns="45720" rIns="91440" bIns="45720" rtlCol="0" anchor="b"/>
+          <a:lstStyle>
+            <a:lvl1pPr algn="l">
+              <a:defRPr sz="1200"/>
+            </a:lvl1pPr>
+          </a:lstStyle>
+          <a:p>
+            <a:endParaRPr lang="en-US"/>
+          </a:p>
+        </p:txBody>
+      </p:sp>
+      <p:sp>
+        <p:nvSpPr>
+          <p:cNvPr id="7" name="Slide Number Placeholder 6"/>
+          <p:cNvSpPr>
+            <a:spLocks noGrp="1"/>
+          </p:cNvSpPr>
+          <p:nvPr>
+            <p:ph type="sldNum" sz="quarter" idx="5"/>
+          </p:nvPr>
+        </p:nvSpPr>
+        <p:spPr>
+          <a:xfrm>
+            <a:off x="3884613" y="8685213"/>
+            <a:ext cx="2971800" cy="458787"/>
+          </a:xfrm>
+          <a:prstGeom prst="rect">
+            <a:avLst/>
+          </a:prstGeom>
+        </p:spPr>
+        <p:txBody>
+          <a:bodyPr vert="horz" lIns="91440" tIns="45720" rIns="91440" bIns="45720" rtlCol="0" anchor="b"/>
+          <a:lstStyle>
+            <a:lvl1pPr algn="r">
+              <a:defRPr sz="1200"/>
+            </a:lvl1pPr>
+          </a:lstStyle>
+          <a:p>
+            <a:fld id="{D4242D44-AF49-4F03-AE49-0A43E2B53530}" type="slidenum">
+              <a:rPr lang="en-US" smtClean="0"/>
+              <a:t>‹#›</a:t>
+            </a:fld>
+            <a:endParaRPr lang="en-US"/>
+          </a:p>
+        </p:txBody>
+      </p:sp>
+    </p:spTree>
+    <p:extLst>
+      <p:ext uri="{BB962C8B-B14F-4D97-AF65-F5344CB8AC3E}">
+        <p14:creationId xmlns:p14="http://schemas.microsoft.com/office/powerpoint/2010/main" val="701025002"/>
+      </p:ext>
+    </p:extLst>
+  </p:cSld>
+  <p:clrMap bg1="lt1" tx1="dk1" bg2="lt2" tx2="dk2" accent1="accent1" accent2="accent2" accent3="accent3" accent4="accent4" accent5="accent5" accent6="accent6" hlink="hlink" folHlink="folHlink"/>
+  <p:notesStyle>
+    <a:lvl1pPr marL="0" algn="l" defTabSz="914400" rtl="0" eaLnBrk="1" latinLnBrk="0" hangingPunct="1">
+      <a:defRPr sz="1200" kern="1200">
+        <a:solidFill>
+          <a:schemeClr val="tx1"/>
+        </a:solidFill>
+        <a:latin typeface="+mn-lt"/>
+        <a:ea typeface="+mn-ea"/>
+        <a:cs typeface="+mn-cs"/>
+      </a:defRPr>
+    </a:lvl1pPr>
+    <a:lvl2pPr marL="457200" algn="l" defTabSz="914400" rtl="0" eaLnBrk="1" latinLnBrk="0" hangingPunct="1">
+      <a:defRPr sz="1200" kern="1200">
+        <a:solidFill>
+          <a:schemeClr val="tx1"/>
+        </a:solidFill>
+        <a:latin typeface="+mn-lt"/>
+        <a:ea typeface="+mn-ea"/>
+        <a:cs typeface="+mn-cs"/>
+      </a:defRPr>
+    </a:lvl2pPr>
+    <a:lvl3pPr marL="914400" algn="l" defTabSz="914400" rtl="0" eaLnBrk="1" latinLnBrk="0" hangingPunct="1">
+      <a:defRPr sz="1200" kern="1200">
+        <a:solidFill>
+          <a:schemeClr val="tx1"/>
+        </a:solidFill>
+        <a:latin typeface="+mn-lt"/>
+        <a:ea typeface="+mn-ea"/>
+        <a:cs typeface="+mn-cs"/>
+      </a:defRPr>
+    </a:lvl3pPr>
+    <a:lvl4pPr marL="1371600" algn="l" defTabSz="914400" rtl="0" eaLnBrk="1" latinLnBrk="0" hangingPunct="1">
+      <a:defRPr sz="1200" kern="1200">
+        <a:solidFill>
+          <a:schemeClr val="tx1"/>
+        </a:solidFill>
+        <a:latin typeface="+mn-lt"/>
+        <a:ea typeface="+mn-ea"/>
+        <a:cs typeface="+mn-cs"/>
+      </a:defRPr>
+    </a:lvl4pPr>
+    <a:lvl5pPr marL="1828800" algn="l" defTabSz="914400" rtl="0" eaLnBrk="1" latinLnBrk="0" hangingPunct="1">
+      <a:defRPr sz="1200" kern="1200">
+        <a:solidFill>
+          <a:schemeClr val="tx1"/>
+        </a:solidFill>
+        <a:latin typeface="+mn-lt"/>
+        <a:ea typeface="+mn-ea"/>
+        <a:cs typeface="+mn-cs"/>
+      </a:defRPr>
+    </a:lvl5pPr>
+    <a:lvl6pPr marL="2286000" algn="l" defTabSz="914400" rtl="0" eaLnBrk="1" latinLnBrk="0" hangingPunct="1">
+      <a:defRPr sz="1200" kern="1200">
+        <a:solidFill>
+          <a:schemeClr val="tx1"/>
+        </a:solidFill>
+        <a:latin typeface="+mn-lt"/>
+        <a:ea typeface="+mn-ea"/>
+        <a:cs typeface="+mn-cs"/>
+      </a:defRPr>
+    </a:lvl6pPr>
+    <a:lvl7pPr marL="2743200" algn="l" defTabSz="914400" rtl="0" eaLnBrk="1" latinLnBrk="0" hangingPunct="1">
+      <a:defRPr sz="1200" kern="1200">
+        <a:solidFill>
+          <a:schemeClr val="tx1"/>
+        </a:solidFill>
+        <a:latin typeface="+mn-lt"/>
+        <a:ea typeface="+mn-ea"/>
+        <a:cs typeface="+mn-cs"/>
+      </a:defRPr>
+    </a:lvl7pPr>
+    <a:lvl8pPr marL="3200400" algn="l" defTabSz="914400" rtl="0" eaLnBrk="1" latinLnBrk="0" hangingPunct="1">
+      <a:defRPr sz="1200" kern="1200">
+        <a:solidFill>
+          <a:schemeClr val="tx1"/>
+        </a:solidFill>
+        <a:latin typeface="+mn-lt"/>
+        <a:ea typeface="+mn-ea"/>
+        <a:cs typeface="+mn-cs"/>
+      </a:defRPr>
+    </a:lvl8pPr>
+    <a:lvl9pPr marL="3657600" algn="l" defTabSz="914400" rtl="0" eaLnBrk="1" latinLnBrk="0" hangingPunct="1">
+      <a:defRPr sz="1200" kern="1200">
+        <a:solidFill>
+          <a:schemeClr val="tx1"/>
+        </a:solidFill>
+        <a:latin typeface="+mn-lt"/>
+        <a:ea typeface="+mn-ea"/>
+        <a:cs typeface="+mn-cs"/>
+      </a:defRPr>
+    </a:lvl9pPr>
+  </p:notesStyle>
+</p:notesMaster>
+</file>
+
+<file path=ppt/notesSlides/notesSlide1.xml><?xml version="1.0" encoding="utf-8"?>
+<p:notes xmlns:a="http://schemas.openxmlformats.org/drawingml/2006/main" xmlns:r="http://schemas.openxmlformats.org/officeDocument/2006/relationships" xmlns:p="http://schemas.openxmlformats.org/presentationml/2006/main">
+  <p:cSld>
+    <p:spTree>
+      <p:nvGrpSpPr>
+        <p:cNvPr id="1" name=""/>
+        <p:cNvGrpSpPr/>
+        <p:nvPr/>
+      </p:nvGrpSpPr>
+      <p:grpSpPr>
+        <a:xfrm>
+          <a:off x="0" y="0"/>
+          <a:ext cx="0" cy="0"/>
+          <a:chOff x="0" y="0"/>
+          <a:chExt cx="0" cy="0"/>
+        </a:xfrm>
+      </p:grpSpPr>
+      <p:sp>
+        <p:nvSpPr>
+          <p:cNvPr id="2" name="Slide Image Placeholder 1"/>
+          <p:cNvSpPr>
+            <a:spLocks noGrp="1" noRot="1" noChangeAspect="1"/>
+          </p:cNvSpPr>
+          <p:nvPr>
+            <p:ph type="sldImg"/>
+          </p:nvPr>
+        </p:nvSpPr>
+        <p:spPr/>
+      </p:sp>
+      <p:sp>
+        <p:nvSpPr>
+          <p:cNvPr id="3" name="Notes Placeholder 2"/>
+          <p:cNvSpPr>
+            <a:spLocks noGrp="1"/>
+          </p:cNvSpPr>
+          <p:nvPr>
+            <p:ph type="body" idx="1"/>
+          </p:nvPr>
+        </p:nvSpPr>
+        <p:spPr/>
+        <p:txBody>
+          <a:bodyPr/>
+          <a:lstStyle/>
+          <a:p>
+            <a:endParaRPr lang="en-US"/>
+          </a:p>
+        </p:txBody>
+      </p:sp>
+      <p:sp>
+        <p:nvSpPr>
+          <p:cNvPr id="4" name="Slide Number Placeholder 3"/>
+          <p:cNvSpPr>
+            <a:spLocks noGrp="1"/>
+          </p:cNvSpPr>
+          <p:nvPr>
+            <p:ph type="sldNum" sz="quarter" idx="10"/>
+          </p:nvPr>
+        </p:nvSpPr>
+        <p:spPr/>
+        <p:txBody>
+          <a:bodyPr/>
+          <a:lstStyle/>
+          <a:p>
+            <a:fld id="{D4242D44-AF49-4F03-AE49-0A43E2B53530}" type="slidenum">
+              <a:rPr lang="en-US" smtClean="0"/>
+              <a:t>1</a:t>
+            </a:fld>
+            <a:endParaRPr lang="en-US"/>
+          </a:p>
+        </p:txBody>
+      </p:sp>
+    </p:spTree>
+    <p:extLst>
+      <p:ext uri="{BB962C8B-B14F-4D97-AF65-F5344CB8AC3E}">
+        <p14:creationId xmlns:p14="http://schemas.microsoft.com/office/powerpoint/2010/main" val="1129137204"/>
+      </p:ext>
+    </p:extLst>
+  </p:cSld>
+  <p:clrMapOvr>
+    <a:masterClrMapping/>
+  </p:clrMapOvr>
+</p:notes>
 </file>
 
 <file path=ppt/slideLayouts/slideLayout1.xml><?xml version="1.0" encoding="utf-8"?>
@@ -5984,7 +6421,7 @@
           <p:nvPr/>
         </p:nvPicPr>
         <p:blipFill>
-          <a:blip r:embed="rId2">
+          <a:blip r:embed="rId3">
             <a:extLst>
               <a:ext uri="{28A0092B-C50C-407E-A947-70E740481C1C}">
                 <a14:useLocalDpi xmlns:a14="http://schemas.microsoft.com/office/drawing/2010/main" val="0"/>
@@ -6089,9 +6526,9 @@
           <a:p>
             <a:r>
               <a:rPr lang="en-US" sz="1100" dirty="0" smtClean="0">
-                <a:hlinkClick r:id="rId3"/>
+                <a:hlinkClick r:id="rId4"/>
               </a:rPr>
-              <a:t>www.sites.Lafayette.edu/ece492-sp17</a:t>
+              <a:t>sites.lafayette.edu/ece492-sp17</a:t>
             </a:r>
             <a:endParaRPr lang="en-US" sz="1100" dirty="0" smtClean="0"/>
           </a:p>
@@ -6128,7 +6565,7 @@
         <p:spPr>
           <a:xfrm>
             <a:off x="152400" y="1143000"/>
-            <a:ext cx="2869096" cy="2819400"/>
+            <a:ext cx="2314087" cy="2438400"/>
           </a:xfrm>
           <a:prstGeom prst="rect">
             <a:avLst/>
@@ -6173,8 +6610,8 @@
         </p:nvSpPr>
         <p:spPr>
           <a:xfrm>
-            <a:off x="152400" y="4120515"/>
-            <a:ext cx="2869096" cy="2508885"/>
+            <a:off x="152401" y="3733799"/>
+            <a:ext cx="2314086" cy="2895601"/>
           </a:xfrm>
           <a:prstGeom prst="rect">
             <a:avLst/>
@@ -6219,8 +6656,8 @@
         </p:nvSpPr>
         <p:spPr>
           <a:xfrm>
-            <a:off x="3158973" y="1143000"/>
-            <a:ext cx="3318027" cy="2819400"/>
+            <a:off x="2567894" y="1143000"/>
+            <a:ext cx="3853076" cy="2271354"/>
           </a:xfrm>
           <a:prstGeom prst="rect">
             <a:avLst/>
@@ -6265,8 +6702,8 @@
         </p:nvSpPr>
         <p:spPr>
           <a:xfrm>
-            <a:off x="319403" y="1208694"/>
-            <a:ext cx="2438400" cy="861774"/>
+            <a:off x="228802" y="1190134"/>
+            <a:ext cx="2070338" cy="1046440"/>
           </a:xfrm>
           <a:prstGeom prst="rect">
             <a:avLst/>
@@ -6280,44 +6717,19 @@
           <a:lstStyle/>
           <a:p>
             <a:r>
-              <a:rPr lang="en-US" sz="1000" dirty="0" smtClean="0"/>
+              <a:rPr lang="en-US" sz="1200" dirty="0" smtClean="0"/>
               <a:t>Overview</a:t>
             </a:r>
           </a:p>
           <a:p>
+            <a:endParaRPr lang="en-US" sz="800" dirty="0" smtClean="0"/>
+          </a:p>
+          <a:p>
+            <a:pPr algn="just"/>
             <a:r>
               <a:rPr lang="en-US" sz="800" dirty="0" smtClean="0"/>
-              <a:t>The overall goal of the </a:t>
-            </a:r>
-            <a:r>
-              <a:rPr lang="en-US" sz="800" dirty="0" smtClean="0"/>
-              <a:t>Tractive System Interface is </a:t>
-            </a:r>
-            <a:r>
-              <a:rPr lang="en-US" sz="800" dirty="0" smtClean="0"/>
-              <a:t>to </a:t>
-            </a:r>
-            <a:r>
-              <a:rPr lang="en-US" sz="800" dirty="0" smtClean="0"/>
-              <a:t>safely connect </a:t>
-            </a:r>
-            <a:r>
-              <a:rPr lang="en-US" sz="800" dirty="0" smtClean="0"/>
-              <a:t>high </a:t>
-            </a:r>
-            <a:r>
-              <a:rPr lang="en-US" sz="800" dirty="0" smtClean="0"/>
-              <a:t>voltage from the packs to the motor </a:t>
-            </a:r>
-            <a:r>
-              <a:rPr lang="en-US" sz="800" dirty="0" smtClean="0"/>
-              <a:t>controller.</a:t>
-            </a:r>
-            <a:r>
-              <a:rPr lang="en-US" sz="800" dirty="0" smtClean="0"/>
-              <a:t> </a:t>
-            </a:r>
-            <a:endParaRPr lang="en-US" sz="800" dirty="0" smtClean="0"/>
+              <a:t>The overall goal of the Tractive System Interface is to safely connect high voltage from the packs to the motor controller. </a:t>
+            </a:r>
           </a:p>
           <a:p>
             <a:endParaRPr lang="en-US" sz="800" dirty="0"/>
@@ -6335,8 +6747,8 @@
         </p:nvSpPr>
         <p:spPr>
           <a:xfrm>
-            <a:off x="3158973" y="4114799"/>
-            <a:ext cx="3318027" cy="2514601"/>
+            <a:off x="2570141" y="3541316"/>
+            <a:ext cx="3850829" cy="3088085"/>
           </a:xfrm>
           <a:prstGeom prst="rect">
             <a:avLst/>
@@ -6381,8 +6793,8 @@
         </p:nvSpPr>
         <p:spPr>
           <a:xfrm>
-            <a:off x="3172770" y="4197536"/>
-            <a:ext cx="2629530" cy="246221"/>
+            <a:off x="2605948" y="3581400"/>
+            <a:ext cx="3642452" cy="1661993"/>
           </a:xfrm>
           <a:prstGeom prst="rect">
             <a:avLst/>
@@ -6395,11 +6807,41 @@
           </a:bodyPr>
           <a:lstStyle/>
           <a:p>
-            <a:r>
-              <a:rPr lang="en-US" sz="1000" dirty="0" smtClean="0"/>
-              <a:t>Testing and Integration</a:t>
-            </a:r>
-            <a:endParaRPr lang="en-US" sz="1000" dirty="0"/>
+            <a:pPr algn="just"/>
+            <a:r>
+              <a:rPr lang="en-US" sz="1200" dirty="0" smtClean="0"/>
+              <a:t>Testing and </a:t>
+            </a:r>
+            <a:r>
+              <a:rPr lang="en-US" sz="1200" dirty="0" smtClean="0"/>
+              <a:t>Integration</a:t>
+            </a:r>
+          </a:p>
+          <a:p>
+            <a:pPr algn="just"/>
+            <a:endParaRPr lang="en-US" sz="800" dirty="0"/>
+          </a:p>
+          <a:p>
+            <a:pPr algn="just"/>
+            <a:r>
+              <a:rPr lang="en-US" sz="800" dirty="0" smtClean="0"/>
+              <a:t>Testing of the TSI subsystem largely revolved around functionality of the board. At the completion of this semester, many of the designed abilities of the board remain unimplemented. As the semester progressed, efforts were directed towards drive-critical components of the subsystem, so that a functional car could be realized.</a:t>
+            </a:r>
+          </a:p>
+          <a:p>
+            <a:pPr algn="just"/>
+            <a:endParaRPr lang="en-US" sz="800" dirty="0"/>
+          </a:p>
+          <a:p>
+            <a:pPr algn="just"/>
+            <a:r>
+              <a:rPr lang="en-US" sz="800" dirty="0" smtClean="0"/>
+              <a:t>Figure 5 (left) shows the test panel that was built to test the subsystem’s driver interface prior to integration. This was able to simulate the two throttle potentiometers, allowing for throttle plausibility checks, as well as brake press and over-travel. These signals were used to confirm drive state operability.</a:t>
+            </a:r>
+          </a:p>
+          <a:p>
+            <a:pPr algn="just"/>
+            <a:endParaRPr lang="en-US" sz="800" dirty="0"/>
           </a:p>
         </p:txBody>
       </p:sp>
@@ -6411,8 +6853,8 @@
         </p:nvSpPr>
         <p:spPr>
           <a:xfrm>
-            <a:off x="6562724" y="1141927"/>
-            <a:ext cx="2457451" cy="1996834"/>
+            <a:off x="6524624" y="1141925"/>
+            <a:ext cx="2495552" cy="2598961"/>
           </a:xfrm>
           <a:prstGeom prst="rect">
             <a:avLst/>
@@ -6457,8 +6899,8 @@
         </p:nvSpPr>
         <p:spPr>
           <a:xfrm>
-            <a:off x="228600" y="4246603"/>
-            <a:ext cx="2191382" cy="369332"/>
+            <a:off x="152400" y="3740887"/>
+            <a:ext cx="2253524" cy="1508105"/>
           </a:xfrm>
           <a:prstGeom prst="rect">
             <a:avLst/>
@@ -6472,18 +6914,27 @@
           <a:lstStyle/>
           <a:p>
             <a:r>
-              <a:rPr lang="en-US" sz="1000" dirty="0" smtClean="0"/>
-              <a:t>PCB</a:t>
-            </a:r>
-          </a:p>
-          <a:p>
+              <a:rPr lang="en-US" sz="1200" dirty="0" smtClean="0"/>
+              <a:t>TSI Board</a:t>
+            </a:r>
+            <a:endParaRPr lang="en-US" sz="1200" dirty="0" smtClean="0"/>
+          </a:p>
+          <a:p>
+            <a:endParaRPr lang="en-US" sz="800" dirty="0" smtClean="0"/>
+          </a:p>
+          <a:p>
+            <a:pPr algn="dist"/>
             <a:r>
               <a:rPr lang="en-US" sz="800" dirty="0" smtClean="0"/>
-              <a:t>The PCB was designed </a:t>
-            </a:r>
-            <a:r>
-              <a:rPr lang="en-US" sz="800" smtClean="0"/>
-              <a:t>to monitor the </a:t>
+              <a:t>All logical control of the TSI subsystem was processed by the PCB. This included monitoring of throttle, brake, and driver input, to determine appropriate drive state and action. </a:t>
+            </a:r>
+            <a:r>
+              <a:rPr lang="en-US" sz="800" dirty="0"/>
+              <a:t>T</a:t>
+            </a:r>
+            <a:r>
+              <a:rPr lang="en-US" sz="800" dirty="0" smtClean="0"/>
+              <a:t>he board is capable of interfacing with VSCADA to send observed data, as well as the reception and transmission of remote throttle control to the motor controller. Additionally, various status lights and signals are controlled by the board.</a:t>
             </a:r>
             <a:endParaRPr lang="en-US" sz="800" dirty="0"/>
           </a:p>
@@ -6497,8 +6948,8 @@
         </p:nvSpPr>
         <p:spPr>
           <a:xfrm>
-            <a:off x="6562724" y="5402101"/>
-            <a:ext cx="2428876" cy="1227299"/>
+            <a:off x="6524623" y="5566564"/>
+            <a:ext cx="2466977" cy="1062836"/>
           </a:xfrm>
           <a:prstGeom prst="rect">
             <a:avLst/>
@@ -6543,8 +6994,8 @@
         </p:nvSpPr>
         <p:spPr>
           <a:xfrm>
-            <a:off x="6632900" y="5402101"/>
-            <a:ext cx="2191382" cy="261610"/>
+            <a:off x="6506693" y="5543862"/>
+            <a:ext cx="1729173" cy="1046440"/>
           </a:xfrm>
           <a:prstGeom prst="rect">
             <a:avLst/>
@@ -6558,10 +7009,28 @@
           <a:lstStyle/>
           <a:p>
             <a:r>
-              <a:rPr lang="en-US" sz="1100" dirty="0" smtClean="0"/>
+              <a:rPr lang="en-US" sz="1200" dirty="0" smtClean="0"/>
               <a:t>Acknowledgements</a:t>
             </a:r>
-            <a:endParaRPr lang="en-US" sz="1100" dirty="0"/>
+          </a:p>
+          <a:p>
+            <a:endParaRPr lang="en-US" sz="800" dirty="0" smtClean="0"/>
+          </a:p>
+          <a:p>
+            <a:pPr algn="just"/>
+            <a:r>
+              <a:rPr lang="en-US" sz="800" dirty="0" smtClean="0"/>
+              <a:t>A special thank you to Marv Snyder, Robert </a:t>
+            </a:r>
+            <a:r>
+              <a:rPr lang="en-US" sz="800" dirty="0" err="1" smtClean="0"/>
+              <a:t>Layng</a:t>
+            </a:r>
+            <a:r>
+              <a:rPr lang="en-US" sz="800" dirty="0" smtClean="0"/>
+              <a:t>, and Adam Smith for helping with the build of our many components. Also thank you to the entire Mechanical Engineering team.</a:t>
+            </a:r>
+            <a:endParaRPr lang="en-US" sz="800" dirty="0"/>
           </a:p>
         </p:txBody>
       </p:sp>
@@ -6573,8 +7042,8 @@
         </p:nvSpPr>
         <p:spPr>
           <a:xfrm>
-            <a:off x="8229600" y="6015750"/>
-            <a:ext cx="762000" cy="613650"/>
+            <a:off x="8299836" y="5943600"/>
+            <a:ext cx="691764" cy="685800"/>
           </a:xfrm>
           <a:prstGeom prst="rect">
             <a:avLst/>
@@ -6608,36 +7077,6 @@
           <a:p>
             <a:pPr algn="ctr"/>
             <a:endParaRPr lang="en-US"/>
-          </a:p>
-        </p:txBody>
-      </p:sp>
-      <p:sp>
-        <p:nvSpPr>
-          <p:cNvPr id="23" name="TextBox 22"/>
-          <p:cNvSpPr txBox="1"/>
-          <p:nvPr/>
-        </p:nvSpPr>
-        <p:spPr>
-          <a:xfrm>
-            <a:off x="8229600" y="6322575"/>
-            <a:ext cx="762000" cy="276999"/>
-          </a:xfrm>
-          <a:prstGeom prst="rect">
-            <a:avLst/>
-          </a:prstGeom>
-          <a:noFill/>
-        </p:spPr>
-        <p:txBody>
-          <a:bodyPr wrap="square" rtlCol="0">
-            <a:spAutoFit/>
-          </a:bodyPr>
-          <a:lstStyle/>
-          <a:p>
-            <a:r>
-              <a:rPr lang="en-US" sz="1200" dirty="0" smtClean="0"/>
-              <a:t>QR CODE</a:t>
-            </a:r>
-            <a:endParaRPr lang="en-US" sz="1200" dirty="0"/>
           </a:p>
         </p:txBody>
       </p:sp>
@@ -6695,8 +7134,8 @@
         </p:nvSpPr>
         <p:spPr>
           <a:xfrm>
-            <a:off x="3172770" y="228600"/>
-            <a:ext cx="3048000" cy="756285"/>
+            <a:off x="3010846" y="228600"/>
+            <a:ext cx="3312948" cy="756285"/>
           </a:xfrm>
           <a:prstGeom prst="rect">
             <a:avLst/>
@@ -6788,7 +7227,7 @@
           <p:nvPr/>
         </p:nvPicPr>
         <p:blipFill rotWithShape="1">
-          <a:blip r:embed="rId4" cstate="print">
+          <a:blip r:embed="rId5" cstate="print">
             <a:extLst>
               <a:ext uri="{28A0092B-C50C-407E-A947-70E740481C1C}">
                 <a14:useLocalDpi xmlns:a14="http://schemas.microsoft.com/office/drawing/2010/main" val="0"/>
@@ -6800,8 +7239,8 @@
         </p:blipFill>
         <p:spPr>
           <a:xfrm>
-            <a:off x="2848606" y="6198505"/>
-            <a:ext cx="1590676" cy="354418"/>
+            <a:off x="2699545" y="5975722"/>
+            <a:ext cx="1940476" cy="432356"/>
           </a:xfrm>
           <a:prstGeom prst="rect">
             <a:avLst/>
@@ -6817,7 +7256,7 @@
           <p:nvPr/>
         </p:nvPicPr>
         <p:blipFill rotWithShape="1">
-          <a:blip r:embed="rId5" cstate="print">
+          <a:blip r:embed="rId6" cstate="print">
             <a:extLst>
               <a:ext uri="{28A0092B-C50C-407E-A947-70E740481C1C}">
                 <a14:useLocalDpi xmlns:a14="http://schemas.microsoft.com/office/drawing/2010/main" val="0"/>
@@ -6829,37 +7268,8 @@
         </p:blipFill>
         <p:spPr>
           <a:xfrm>
-            <a:off x="504154" y="5583997"/>
-            <a:ext cx="912848" cy="665440"/>
-          </a:xfrm>
-          <a:prstGeom prst="rect">
-            <a:avLst/>
-          </a:prstGeom>
-        </p:spPr>
-      </p:pic>
-      <p:pic>
-        <p:nvPicPr>
-          <p:cNvPr id="7" name="Picture 6"/>
-          <p:cNvPicPr>
-            <a:picLocks noChangeAspect="1"/>
-          </p:cNvPicPr>
-          <p:nvPr/>
-        </p:nvPicPr>
-        <p:blipFill rotWithShape="1">
-          <a:blip r:embed="rId6" cstate="print">
-            <a:extLst>
-              <a:ext uri="{28A0092B-C50C-407E-A947-70E740481C1C}">
-                <a14:useLocalDpi xmlns:a14="http://schemas.microsoft.com/office/drawing/2010/main" val="0"/>
-              </a:ext>
-            </a:extLst>
-          </a:blip>
-          <a:srcRect t="8889" b="10000"/>
-          <a:stretch/>
-        </p:blipFill>
-        <p:spPr>
-          <a:xfrm>
-            <a:off x="4371750" y="5351643"/>
-            <a:ext cx="762000" cy="824088"/>
+            <a:off x="431358" y="5272372"/>
+            <a:ext cx="1557958" cy="1135706"/>
           </a:xfrm>
           <a:prstGeom prst="rect">
             <a:avLst/>
@@ -6888,8 +7298,8 @@
         </p:blipFill>
         <p:spPr>
           <a:xfrm>
-            <a:off x="530074" y="2318156"/>
-            <a:ext cx="1451814" cy="1203216"/>
+            <a:off x="369448" y="1951554"/>
+            <a:ext cx="1671872" cy="1385592"/>
           </a:xfrm>
           <a:prstGeom prst="rect">
             <a:avLst/>
@@ -6904,8 +7314,8 @@
         </p:nvSpPr>
         <p:spPr>
           <a:xfrm>
-            <a:off x="6557423" y="3308039"/>
-            <a:ext cx="2457451" cy="1958815"/>
+            <a:off x="6524623" y="3859978"/>
+            <a:ext cx="2490251" cy="1555260"/>
           </a:xfrm>
           <a:prstGeom prst="rect">
             <a:avLst/>
@@ -6950,8 +7360,8 @@
         </p:nvSpPr>
         <p:spPr>
           <a:xfrm>
-            <a:off x="6600185" y="3581983"/>
-            <a:ext cx="2353953" cy="861774"/>
+            <a:off x="6524623" y="3831850"/>
+            <a:ext cx="2353953" cy="1015663"/>
           </a:xfrm>
           <a:prstGeom prst="rect">
             <a:avLst/>
@@ -6965,19 +7375,22 @@
           <a:lstStyle/>
           <a:p>
             <a:r>
-              <a:rPr lang="en-US" sz="1000" dirty="0" smtClean="0"/>
-              <a:t>The Team</a:t>
-            </a:r>
-            <a:endParaRPr lang="en-US" sz="1000" dirty="0" smtClean="0"/>
-          </a:p>
-          <a:p>
+              <a:rPr lang="en-US" sz="1200" dirty="0" smtClean="0"/>
+              <a:t>The </a:t>
+            </a:r>
+            <a:r>
+              <a:rPr lang="en-US" sz="1200" dirty="0" smtClean="0"/>
+              <a:t>Team</a:t>
+            </a:r>
+          </a:p>
+          <a:p>
+            <a:endParaRPr lang="en-US" sz="800" dirty="0" smtClean="0"/>
+          </a:p>
+          <a:p>
+            <a:pPr algn="just"/>
             <a:r>
               <a:rPr lang="en-US" sz="800" dirty="0" smtClean="0"/>
-              <a:t>The Tractive System Interface </a:t>
-            </a:r>
-            <a:r>
-              <a:rPr lang="en-US" sz="800" dirty="0" smtClean="0"/>
-              <a:t>consisted of somewhat working components, and hardly working team members, fueled mainly with the promise of breakfast pastries and low priced beers at the local tavern.</a:t>
+              <a:t>The Tractive System Interface consisted of somewhat working components, and hardly working team members, fueled mainly with the promise of breakfast pastries and low priced beers at the local tavern.</a:t>
             </a:r>
             <a:endParaRPr lang="en-US" sz="800" dirty="0"/>
           </a:p>
@@ -7004,8 +7417,8 @@
         </p:blipFill>
         <p:spPr bwMode="auto">
           <a:xfrm>
-            <a:off x="7162800" y="2142737"/>
-            <a:ext cx="1219200" cy="897315"/>
+            <a:off x="7014772" y="2352757"/>
+            <a:ext cx="1509952" cy="1111306"/>
           </a:xfrm>
           <a:prstGeom prst="rect">
             <a:avLst/>
@@ -7031,7 +7444,7 @@
         <p:spPr>
           <a:xfrm>
             <a:off x="6609171" y="1184483"/>
-            <a:ext cx="2353953" cy="984885"/>
+            <a:ext cx="2353953" cy="1169551"/>
           </a:xfrm>
           <a:prstGeom prst="rect">
             <a:avLst/>
@@ -7045,20 +7458,19 @@
           <a:lstStyle/>
           <a:p>
             <a:r>
-              <a:rPr lang="en-US" sz="1000" dirty="0" smtClean="0"/>
+              <a:rPr lang="en-US" sz="1200" dirty="0" smtClean="0"/>
               <a:t>Enclosure</a:t>
             </a:r>
           </a:p>
           <a:p>
+            <a:endParaRPr lang="en-US" sz="800" dirty="0" smtClean="0"/>
+          </a:p>
+          <a:p>
+            <a:pPr algn="just"/>
             <a:r>
               <a:rPr lang="en-US" sz="800" dirty="0" smtClean="0"/>
-              <a:t>The TSI Enclosure was designed to neatly house all systems </a:t>
-            </a:r>
-            <a:r>
-              <a:rPr lang="en-US" sz="800" dirty="0" smtClean="0"/>
-              <a:t>needed to safely operate the vehicle. Electric insulation was needed to protect the parts from the metal walls. Panels were fabricated separately to allow for adaptability if new ports were needed.</a:t>
-            </a:r>
-            <a:endParaRPr lang="en-US" sz="800" dirty="0" smtClean="0"/>
+              <a:t>The TSI Enclosure was designed to neatly house all systems needed to safely operate the vehicle. Electric insulation was needed to protect the parts from the metal walls. Panels were fabricated separately to allow for adaptability if new ports were needed.</a:t>
+            </a:r>
           </a:p>
         </p:txBody>
       </p:sp>
@@ -7084,8 +7496,8 @@
         </p:blipFill>
         <p:spPr>
           <a:xfrm>
-            <a:off x="4809002" y="3010654"/>
-            <a:ext cx="1455976" cy="904944"/>
+            <a:off x="4413716" y="1510136"/>
+            <a:ext cx="1824852" cy="1134214"/>
           </a:xfrm>
           <a:prstGeom prst="rect">
             <a:avLst/>
@@ -7100,8 +7512,8 @@
         </p:nvSpPr>
         <p:spPr>
           <a:xfrm>
-            <a:off x="3205200" y="1208694"/>
-            <a:ext cx="1963668" cy="1600438"/>
+            <a:off x="2699545" y="1159879"/>
+            <a:ext cx="1729582" cy="2154436"/>
           </a:xfrm>
           <a:prstGeom prst="rect">
             <a:avLst/>
@@ -7116,7 +7528,7 @@
           <a:p>
             <a:pPr lvl="0"/>
             <a:r>
-              <a:rPr lang="en-US" sz="1000" dirty="0" smtClean="0">
+              <a:rPr lang="en-US" sz="1200" dirty="0" smtClean="0">
                 <a:solidFill>
                   <a:prstClr val="black"/>
                 </a:solidFill>
@@ -7126,6 +7538,14 @@
           </a:p>
           <a:p>
             <a:pPr lvl="0"/>
+            <a:endParaRPr lang="en-US" sz="800" dirty="0" smtClean="0">
+              <a:solidFill>
+                <a:prstClr val="black"/>
+              </a:solidFill>
+            </a:endParaRPr>
+          </a:p>
+          <a:p>
+            <a:pPr lvl="0" algn="just"/>
             <a:r>
               <a:rPr lang="en-US" sz="800" dirty="0" smtClean="0">
                 <a:solidFill>
@@ -7145,6 +7565,14 @@
           </a:p>
           <a:p>
             <a:pPr lvl="0"/>
+            <a:endParaRPr lang="en-US" sz="800" dirty="0" smtClean="0">
+              <a:solidFill>
+                <a:prstClr val="black"/>
+              </a:solidFill>
+            </a:endParaRPr>
+          </a:p>
+          <a:p>
+            <a:pPr lvl="0"/>
             <a:r>
               <a:rPr lang="en-US" sz="800" dirty="0" smtClean="0">
                 <a:solidFill>
@@ -7193,12 +7621,34 @@
               <a:buChar char="•"/>
             </a:pPr>
             <a:r>
+              <a:rPr lang="en-US" sz="800" dirty="0" smtClean="0">
+                <a:solidFill>
+                  <a:prstClr val="black"/>
+                </a:solidFill>
+              </a:rPr>
+              <a:t>Voltage Measurement</a:t>
+            </a:r>
+          </a:p>
+          <a:p>
+            <a:pPr marL="285750" lvl="0" indent="-285750">
+              <a:buFont typeface="Arial" panose="020B0604020202020204" pitchFamily="34" charset="0"/>
+              <a:buChar char="•"/>
+            </a:pPr>
+            <a:r>
+              <a:rPr lang="en-US" sz="800" dirty="0" smtClean="0">
+                <a:solidFill>
+                  <a:prstClr val="black"/>
+                </a:solidFill>
+              </a:rPr>
+              <a:t>Current </a:t>
+            </a:r>
+            <a:r>
               <a:rPr lang="en-US" sz="800" dirty="0">
                 <a:solidFill>
                   <a:prstClr val="black"/>
                 </a:solidFill>
               </a:rPr>
-              <a:t>Voltage/Current Measurement</a:t>
+              <a:t>Measurement</a:t>
             </a:r>
           </a:p>
           <a:p>
@@ -7258,6 +7708,288 @@
           </a:p>
         </p:txBody>
       </p:sp>
+      <p:pic>
+        <p:nvPicPr>
+          <p:cNvPr id="8" name="Picture 7"/>
+          <p:cNvPicPr>
+            <a:picLocks noChangeAspect="1"/>
+          </p:cNvPicPr>
+          <p:nvPr/>
+        </p:nvPicPr>
+        <p:blipFill>
+          <a:blip r:embed="rId10" cstate="print">
+            <a:extLst>
+              <a:ext uri="{28A0092B-C50C-407E-A947-70E740481C1C}">
+                <a14:useLocalDpi xmlns:a14="http://schemas.microsoft.com/office/drawing/2010/main" val="0"/>
+              </a:ext>
+            </a:extLst>
+          </a:blip>
+          <a:stretch>
+            <a:fillRect/>
+          </a:stretch>
+        </p:blipFill>
+        <p:spPr>
+          <a:xfrm>
+            <a:off x="4870844" y="5248502"/>
+            <a:ext cx="1260772" cy="945580"/>
+          </a:xfrm>
+          <a:prstGeom prst="rect">
+            <a:avLst/>
+          </a:prstGeom>
+        </p:spPr>
+      </p:pic>
+      <p:sp>
+        <p:nvSpPr>
+          <p:cNvPr id="11" name="TextBox 10"/>
+          <p:cNvSpPr txBox="1"/>
+          <p:nvPr/>
+        </p:nvSpPr>
+        <p:spPr>
+          <a:xfrm>
+            <a:off x="4654233" y="2733715"/>
+            <a:ext cx="1343817" cy="276999"/>
+          </a:xfrm>
+          <a:prstGeom prst="rect">
+            <a:avLst/>
+          </a:prstGeom>
+          <a:noFill/>
+        </p:spPr>
+        <p:txBody>
+          <a:bodyPr wrap="square" rtlCol="0">
+            <a:spAutoFit/>
+          </a:bodyPr>
+          <a:lstStyle/>
+          <a:p>
+            <a:r>
+              <a:rPr lang="en-US" sz="600" dirty="0" smtClean="0"/>
+              <a:t>Fig. 2: Detailed shutdown conditions and states of the car.</a:t>
+            </a:r>
+            <a:endParaRPr lang="en-US" sz="600" dirty="0"/>
+          </a:p>
+        </p:txBody>
+      </p:sp>
+      <p:sp>
+        <p:nvSpPr>
+          <p:cNvPr id="33" name="TextBox 32"/>
+          <p:cNvSpPr txBox="1"/>
+          <p:nvPr/>
+        </p:nvSpPr>
+        <p:spPr>
+          <a:xfrm>
+            <a:off x="502790" y="3319108"/>
+            <a:ext cx="1548053" cy="184666"/>
+          </a:xfrm>
+          <a:prstGeom prst="rect">
+            <a:avLst/>
+          </a:prstGeom>
+          <a:noFill/>
+        </p:spPr>
+        <p:txBody>
+          <a:bodyPr wrap="square" rtlCol="0">
+            <a:spAutoFit/>
+          </a:bodyPr>
+          <a:lstStyle/>
+          <a:p>
+            <a:r>
+              <a:rPr lang="en-US" sz="600" dirty="0" smtClean="0"/>
+              <a:t>Fig. 1: </a:t>
+            </a:r>
+            <a:r>
+              <a:rPr lang="en-US" sz="600" dirty="0"/>
+              <a:t>S</a:t>
+            </a:r>
+            <a:r>
+              <a:rPr lang="en-US" sz="600" dirty="0" smtClean="0"/>
+              <a:t>implified system block diagram </a:t>
+            </a:r>
+            <a:endParaRPr lang="en-US" sz="600" dirty="0"/>
+          </a:p>
+        </p:txBody>
+      </p:sp>
+      <p:sp>
+        <p:nvSpPr>
+          <p:cNvPr id="34" name="TextBox 33"/>
+          <p:cNvSpPr txBox="1"/>
+          <p:nvPr/>
+        </p:nvSpPr>
+        <p:spPr>
+          <a:xfrm>
+            <a:off x="596770" y="6431459"/>
+            <a:ext cx="1217228" cy="184666"/>
+          </a:xfrm>
+          <a:prstGeom prst="rect">
+            <a:avLst/>
+          </a:prstGeom>
+          <a:noFill/>
+        </p:spPr>
+        <p:txBody>
+          <a:bodyPr wrap="square" rtlCol="0">
+            <a:spAutoFit/>
+          </a:bodyPr>
+          <a:lstStyle/>
+          <a:p>
+            <a:r>
+              <a:rPr lang="en-US" sz="600" dirty="0" smtClean="0"/>
+              <a:t>Fig. 4: Fully populated TSI board</a:t>
+            </a:r>
+            <a:endParaRPr lang="en-US" sz="600" dirty="0"/>
+          </a:p>
+        </p:txBody>
+      </p:sp>
+      <p:sp>
+        <p:nvSpPr>
+          <p:cNvPr id="35" name="TextBox 34"/>
+          <p:cNvSpPr txBox="1"/>
+          <p:nvPr/>
+        </p:nvSpPr>
+        <p:spPr>
+          <a:xfrm>
+            <a:off x="6936211" y="3493565"/>
+            <a:ext cx="1710373" cy="184666"/>
+          </a:xfrm>
+          <a:prstGeom prst="rect">
+            <a:avLst/>
+          </a:prstGeom>
+          <a:noFill/>
+        </p:spPr>
+        <p:txBody>
+          <a:bodyPr wrap="square" rtlCol="0">
+            <a:spAutoFit/>
+          </a:bodyPr>
+          <a:lstStyle/>
+          <a:p>
+            <a:r>
+              <a:rPr lang="en-US" sz="600" dirty="0" smtClean="0"/>
+              <a:t>Fig. 3: Assembled Inventor file of TSI enclosure</a:t>
+            </a:r>
+            <a:endParaRPr lang="en-US" sz="600" dirty="0"/>
+          </a:p>
+        </p:txBody>
+      </p:sp>
+      <p:sp>
+        <p:nvSpPr>
+          <p:cNvPr id="31" name="TextBox 30"/>
+          <p:cNvSpPr txBox="1"/>
+          <p:nvPr/>
+        </p:nvSpPr>
+        <p:spPr>
+          <a:xfrm>
+            <a:off x="2914223" y="6409778"/>
+            <a:ext cx="1529464" cy="184666"/>
+          </a:xfrm>
+          <a:prstGeom prst="rect">
+            <a:avLst/>
+          </a:prstGeom>
+          <a:noFill/>
+        </p:spPr>
+        <p:txBody>
+          <a:bodyPr wrap="square" rtlCol="0">
+            <a:spAutoFit/>
+          </a:bodyPr>
+          <a:lstStyle/>
+          <a:p>
+            <a:r>
+              <a:rPr lang="en-US" sz="600" dirty="0" smtClean="0"/>
+              <a:t>Fig. 5: Test panel of driver interface</a:t>
+            </a:r>
+            <a:endParaRPr lang="en-US" sz="600" dirty="0"/>
+          </a:p>
+        </p:txBody>
+      </p:sp>
+      <p:sp>
+        <p:nvSpPr>
+          <p:cNvPr id="37" name="TextBox 36"/>
+          <p:cNvSpPr txBox="1"/>
+          <p:nvPr/>
+        </p:nvSpPr>
+        <p:spPr>
+          <a:xfrm>
+            <a:off x="4890952" y="6261019"/>
+            <a:ext cx="1123880" cy="184666"/>
+          </a:xfrm>
+          <a:prstGeom prst="rect">
+            <a:avLst/>
+          </a:prstGeom>
+          <a:noFill/>
+        </p:spPr>
+        <p:txBody>
+          <a:bodyPr wrap="square" rtlCol="0">
+            <a:spAutoFit/>
+          </a:bodyPr>
+          <a:lstStyle/>
+          <a:p>
+            <a:r>
+              <a:rPr lang="en-US" sz="600" dirty="0" smtClean="0"/>
+              <a:t>Fig. 6: TSI integrated into car</a:t>
+            </a:r>
+            <a:endParaRPr lang="en-US" sz="600" dirty="0"/>
+          </a:p>
+        </p:txBody>
+      </p:sp>
+      <p:sp>
+        <p:nvSpPr>
+          <p:cNvPr id="36" name="TextBox 35"/>
+          <p:cNvSpPr txBox="1"/>
+          <p:nvPr/>
+        </p:nvSpPr>
+        <p:spPr>
+          <a:xfrm>
+            <a:off x="2603850" y="5085358"/>
+            <a:ext cx="2150210" cy="984885"/>
+          </a:xfrm>
+          <a:prstGeom prst="rect">
+            <a:avLst/>
+          </a:prstGeom>
+          <a:noFill/>
+        </p:spPr>
+        <p:txBody>
+          <a:bodyPr wrap="square" rtlCol="0">
+            <a:spAutoFit/>
+          </a:bodyPr>
+          <a:lstStyle/>
+          <a:p>
+            <a:pPr algn="just"/>
+            <a:r>
+              <a:rPr lang="en-US" sz="800" dirty="0"/>
+              <a:t>Figure 6 (right) is the fully integrated subsystem mounted on the car. Here you can see the high voltage connections entering and leaving the enclosure, as well as the motor controller connections.</a:t>
+            </a:r>
+          </a:p>
+          <a:p>
+            <a:pPr algn="just"/>
+            <a:endParaRPr lang="en-US" dirty="0"/>
+          </a:p>
+        </p:txBody>
+      </p:sp>
+      <p:pic>
+        <p:nvPicPr>
+          <p:cNvPr id="38" name="Picture 37"/>
+          <p:cNvPicPr>
+            <a:picLocks noChangeAspect="1"/>
+          </p:cNvPicPr>
+          <p:nvPr/>
+        </p:nvPicPr>
+        <p:blipFill>
+          <a:blip r:embed="rId11" cstate="print">
+            <a:extLst>
+              <a:ext uri="{28A0092B-C50C-407E-A947-70E740481C1C}">
+                <a14:useLocalDpi xmlns:a14="http://schemas.microsoft.com/office/drawing/2010/main" val="0"/>
+              </a:ext>
+            </a:extLst>
+          </a:blip>
+          <a:stretch>
+            <a:fillRect/>
+          </a:stretch>
+        </p:blipFill>
+        <p:spPr>
+          <a:xfrm flipV="1">
+            <a:off x="8350166" y="5973101"/>
+            <a:ext cx="592836" cy="592836"/>
+          </a:xfrm>
+          <a:prstGeom prst="rect">
+            <a:avLst/>
+          </a:prstGeom>
+        </p:spPr>
+      </p:pic>
     </p:spTree>
   </p:cSld>
   <p:clrMapOvr>
@@ -7837,4 +8569,265 @@
   <a:objectDefaults/>
   <a:extraClrSchemeLst/>
 </a:theme>
+</file>
+
+<file path=ppt/theme/theme3.xml><?xml version="1.0" encoding="utf-8"?>
+<a:theme xmlns:a="http://schemas.openxmlformats.org/drawingml/2006/main" name="Office Theme">
+  <a:themeElements>
+    <a:clrScheme name="Office">
+      <a:dk1>
+        <a:sysClr val="windowText" lastClr="000000"/>
+      </a:dk1>
+      <a:lt1>
+        <a:sysClr val="window" lastClr="FFFFFF"/>
+      </a:lt1>
+      <a:dk2>
+        <a:srgbClr val="44546A"/>
+      </a:dk2>
+      <a:lt2>
+        <a:srgbClr val="E7E6E6"/>
+      </a:lt2>
+      <a:accent1>
+        <a:srgbClr val="5B9BD5"/>
+      </a:accent1>
+      <a:accent2>
+        <a:srgbClr val="ED7D31"/>
+      </a:accent2>
+      <a:accent3>
+        <a:srgbClr val="A5A5A5"/>
+      </a:accent3>
+      <a:accent4>
+        <a:srgbClr val="FFC000"/>
+      </a:accent4>
+      <a:accent5>
+        <a:srgbClr val="4472C4"/>
+      </a:accent5>
+      <a:accent6>
+        <a:srgbClr val="70AD47"/>
+      </a:accent6>
+      <a:hlink>
+        <a:srgbClr val="0563C1"/>
+      </a:hlink>
+      <a:folHlink>
+        <a:srgbClr val="954F72"/>
+      </a:folHlink>
+    </a:clrScheme>
+    <a:fontScheme name="Office">
+      <a:majorFont>
+        <a:latin typeface="Calibri Light" panose="020F0302020204030204"/>
+        <a:ea typeface=""/>
+        <a:cs typeface=""/>
+        <a:font script="Jpan" typeface="ＭＳ Ｐゴシック"/>
+        <a:font script="Hang" typeface="맑은 고딕"/>
+        <a:font script="Hans" typeface="宋体"/>
+        <a:font script="Hant" typeface="新細明體"/>
+        <a:font script="Arab" typeface="Times New Roman"/>
+        <a:font script="Hebr" typeface="Times New Roman"/>
+        <a:font script="Thai" typeface="Angsana New"/>
+        <a:font script="Ethi" typeface="Nyala"/>
+        <a:font script="Beng" typeface="Vrinda"/>
+        <a:font script="Gujr" typeface="Shruti"/>
+        <a:font script="Khmr" typeface="MoolBoran"/>
+        <a:font script="Knda" typeface="Tunga"/>
+        <a:font script="Guru" typeface="Raavi"/>
+        <a:font script="Cans" typeface="Euphemia"/>
+        <a:font script="Cher" typeface="Plantagenet Cherokee"/>
+        <a:font script="Yiii" typeface="Microsoft Yi Baiti"/>
+        <a:font script="Tibt" typeface="Microsoft Himalaya"/>
+        <a:font script="Thaa" typeface="MV Boli"/>
+        <a:font script="Deva" typeface="Mangal"/>
+        <a:font script="Telu" typeface="Gautami"/>
+        <a:font script="Taml" typeface="Latha"/>
+        <a:font script="Syrc" typeface="Estrangelo Edessa"/>
+        <a:font script="Orya" typeface="Kalinga"/>
+        <a:font script="Mlym" typeface="Kartika"/>
+        <a:font script="Laoo" typeface="DokChampa"/>
+        <a:font script="Sinh" typeface="Iskoola Pota"/>
+        <a:font script="Mong" typeface="Mongolian Baiti"/>
+        <a:font script="Viet" typeface="Times New Roman"/>
+        <a:font script="Uigh" typeface="Microsoft Uighur"/>
+        <a:font script="Geor" typeface="Sylfaen"/>
+      </a:majorFont>
+      <a:minorFont>
+        <a:latin typeface="Calibri" panose="020F0502020204030204"/>
+        <a:ea typeface=""/>
+        <a:cs typeface=""/>
+        <a:font script="Jpan" typeface="ＭＳ Ｐゴシック"/>
+        <a:font script="Hang" typeface="맑은 고딕"/>
+        <a:font script="Hans" typeface="宋体"/>
+        <a:font script="Hant" typeface="新細明體"/>
+        <a:font script="Arab" typeface="Arial"/>
+        <a:font script="Hebr" typeface="Arial"/>
+        <a:font script="Thai" typeface="Cordia New"/>
+        <a:font script="Ethi" typeface="Nyala"/>
+        <a:font script="Beng" typeface="Vrinda"/>
+        <a:font script="Gujr" typeface="Shruti"/>
+        <a:font script="Khmr" typeface="DaunPenh"/>
+        <a:font script="Knda" typeface="Tunga"/>
+        <a:font script="Guru" typeface="Raavi"/>
+        <a:font script="Cans" typeface="Euphemia"/>
+        <a:font script="Cher" typeface="Plantagenet Cherokee"/>
+        <a:font script="Yiii" typeface="Microsoft Yi Baiti"/>
+        <a:font script="Tibt" typeface="Microsoft Himalaya"/>
+        <a:font script="Thaa" typeface="MV Boli"/>
+        <a:font script="Deva" typeface="Mangal"/>
+        <a:font script="Telu" typeface="Gautami"/>
+        <a:font script="Taml" typeface="Latha"/>
+        <a:font script="Syrc" typeface="Estrangelo Edessa"/>
+        <a:font script="Orya" typeface="Kalinga"/>
+        <a:font script="Mlym" typeface="Kartika"/>
+        <a:font script="Laoo" typeface="DokChampa"/>
+        <a:font script="Sinh" typeface="Iskoola Pota"/>
+        <a:font script="Mong" typeface="Mongolian Baiti"/>
+        <a:font script="Viet" typeface="Arial"/>
+        <a:font script="Uigh" typeface="Microsoft Uighur"/>
+        <a:font script="Geor" typeface="Sylfaen"/>
+      </a:minorFont>
+    </a:fontScheme>
+    <a:fmtScheme name="Office">
+      <a:fillStyleLst>
+        <a:solidFill>
+          <a:schemeClr val="phClr"/>
+        </a:solidFill>
+        <a:gradFill rotWithShape="1">
+          <a:gsLst>
+            <a:gs pos="0">
+              <a:schemeClr val="phClr">
+                <a:lumMod val="110000"/>
+                <a:satMod val="105000"/>
+                <a:tint val="67000"/>
+              </a:schemeClr>
+            </a:gs>
+            <a:gs pos="50000">
+              <a:schemeClr val="phClr">
+                <a:lumMod val="105000"/>
+                <a:satMod val="103000"/>
+                <a:tint val="73000"/>
+              </a:schemeClr>
+            </a:gs>
+            <a:gs pos="100000">
+              <a:schemeClr val="phClr">
+                <a:lumMod val="105000"/>
+                <a:satMod val="109000"/>
+                <a:tint val="81000"/>
+              </a:schemeClr>
+            </a:gs>
+          </a:gsLst>
+          <a:lin ang="5400000" scaled="0"/>
+        </a:gradFill>
+        <a:gradFill rotWithShape="1">
+          <a:gsLst>
+            <a:gs pos="0">
+              <a:schemeClr val="phClr">
+                <a:satMod val="103000"/>
+                <a:lumMod val="102000"/>
+                <a:tint val="94000"/>
+              </a:schemeClr>
+            </a:gs>
+            <a:gs pos="50000">
+              <a:schemeClr val="phClr">
+                <a:satMod val="110000"/>
+                <a:lumMod val="100000"/>
+                <a:shade val="100000"/>
+              </a:schemeClr>
+            </a:gs>
+            <a:gs pos="100000">
+              <a:schemeClr val="phClr">
+                <a:lumMod val="99000"/>
+                <a:satMod val="120000"/>
+                <a:shade val="78000"/>
+              </a:schemeClr>
+            </a:gs>
+          </a:gsLst>
+          <a:lin ang="5400000" scaled="0"/>
+        </a:gradFill>
+      </a:fillStyleLst>
+      <a:lnStyleLst>
+        <a:ln w="6350" cap="flat" cmpd="sng" algn="ctr">
+          <a:solidFill>
+            <a:schemeClr val="phClr"/>
+          </a:solidFill>
+          <a:prstDash val="solid"/>
+          <a:miter lim="800000"/>
+        </a:ln>
+        <a:ln w="12700" cap="flat" cmpd="sng" algn="ctr">
+          <a:solidFill>
+            <a:schemeClr val="phClr"/>
+          </a:solidFill>
+          <a:prstDash val="solid"/>
+          <a:miter lim="800000"/>
+        </a:ln>
+        <a:ln w="19050" cap="flat" cmpd="sng" algn="ctr">
+          <a:solidFill>
+            <a:schemeClr val="phClr"/>
+          </a:solidFill>
+          <a:prstDash val="solid"/>
+          <a:miter lim="800000"/>
+        </a:ln>
+      </a:lnStyleLst>
+      <a:effectStyleLst>
+        <a:effectStyle>
+          <a:effectLst/>
+        </a:effectStyle>
+        <a:effectStyle>
+          <a:effectLst/>
+        </a:effectStyle>
+        <a:effectStyle>
+          <a:effectLst>
+            <a:outerShdw blurRad="57150" dist="19050" dir="5400000" algn="ctr" rotWithShape="0">
+              <a:srgbClr val="000000">
+                <a:alpha val="63000"/>
+              </a:srgbClr>
+            </a:outerShdw>
+          </a:effectLst>
+        </a:effectStyle>
+      </a:effectStyleLst>
+      <a:bgFillStyleLst>
+        <a:solidFill>
+          <a:schemeClr val="phClr"/>
+        </a:solidFill>
+        <a:solidFill>
+          <a:schemeClr val="phClr">
+            <a:tint val="95000"/>
+            <a:satMod val="170000"/>
+          </a:schemeClr>
+        </a:solidFill>
+        <a:gradFill rotWithShape="1">
+          <a:gsLst>
+            <a:gs pos="0">
+              <a:schemeClr val="phClr">
+                <a:tint val="93000"/>
+                <a:satMod val="150000"/>
+                <a:shade val="98000"/>
+                <a:lumMod val="102000"/>
+              </a:schemeClr>
+            </a:gs>
+            <a:gs pos="50000">
+              <a:schemeClr val="phClr">
+                <a:tint val="98000"/>
+                <a:satMod val="130000"/>
+                <a:shade val="90000"/>
+                <a:lumMod val="103000"/>
+              </a:schemeClr>
+            </a:gs>
+            <a:gs pos="100000">
+              <a:schemeClr val="phClr">
+                <a:shade val="63000"/>
+                <a:satMod val="120000"/>
+              </a:schemeClr>
+            </a:gs>
+          </a:gsLst>
+          <a:lin ang="5400000" scaled="0"/>
+        </a:gradFill>
+      </a:bgFillStyleLst>
+    </a:fmtScheme>
+  </a:themeElements>
+  <a:objectDefaults/>
+  <a:extraClrSchemeLst/>
+  <a:extLst>
+    <a:ext uri="{05A4C25C-085E-4340-85A3-A5531E510DB2}">
+      <thm15:themeFamily xmlns:thm15="http://schemas.microsoft.com/office/thememl/2012/main" name="Office Theme" id="{62F939B6-93AF-4DB8-9C6B-D6C7DFDC589F}" vid="{4A3C46E8-61CC-4603-A589-7422A47A8E4A}"/>
+    </a:ext>
+  </a:extLst>
+</a:theme>
 </file>
</xml_diff>

<commit_message>
Removed many words from the Poster.
</commit_message>
<xml_diff>
--- a/TSI_Poster.pptx
+++ b/TSI_Poster.pptx
@@ -209,7 +209,7 @@
           <a:p>
             <a:fld id="{FF53A7D3-A5E6-4ABE-AFCF-408D358163A2}" type="datetimeFigureOut">
               <a:rPr lang="en-US" smtClean="0"/>
-              <a:t>5/9/2017</a:t>
+              <a:t>5/10/2017</a:t>
             </a:fld>
             <a:endParaRPr lang="en-US"/>
           </a:p>
@@ -742,7 +742,7 @@
           <a:p>
             <a:fld id="{D53C406F-A7E7-47DA-9FE1-6771CEBB572B}" type="datetimeFigureOut">
               <a:rPr lang="en-US" smtClean="0"/>
-              <a:t>5/9/2017</a:t>
+              <a:t>5/10/2017</a:t>
             </a:fld>
             <a:endParaRPr lang="en-US"/>
           </a:p>
@@ -907,7 +907,7 @@
           <a:p>
             <a:fld id="{D53C406F-A7E7-47DA-9FE1-6771CEBB572B}" type="datetimeFigureOut">
               <a:rPr lang="en-US" smtClean="0"/>
-              <a:t>5/9/2017</a:t>
+              <a:t>5/10/2017</a:t>
             </a:fld>
             <a:endParaRPr lang="en-US"/>
           </a:p>
@@ -1082,7 +1082,7 @@
           <a:p>
             <a:fld id="{D53C406F-A7E7-47DA-9FE1-6771CEBB572B}" type="datetimeFigureOut">
               <a:rPr lang="en-US" smtClean="0"/>
-              <a:t>5/9/2017</a:t>
+              <a:t>5/10/2017</a:t>
             </a:fld>
             <a:endParaRPr lang="en-US"/>
           </a:p>
@@ -1319,7 +1319,7 @@
           <a:p>
             <a:fld id="{EC08704B-88A3-4061-B4A3-57E438D2F1A5}" type="datetimeFigureOut">
               <a:rPr lang="en-US" smtClean="0"/>
-              <a:t>5/9/2017</a:t>
+              <a:t>5/10/2017</a:t>
             </a:fld>
             <a:endParaRPr lang="en-US"/>
           </a:p>
@@ -1484,7 +1484,7 @@
           <a:p>
             <a:fld id="{EC08704B-88A3-4061-B4A3-57E438D2F1A5}" type="datetimeFigureOut">
               <a:rPr lang="en-US" smtClean="0"/>
-              <a:t>5/9/2017</a:t>
+              <a:t>5/10/2017</a:t>
             </a:fld>
             <a:endParaRPr lang="en-US"/>
           </a:p>
@@ -1725,7 +1725,7 @@
           <a:p>
             <a:fld id="{EC08704B-88A3-4061-B4A3-57E438D2F1A5}" type="datetimeFigureOut">
               <a:rPr lang="en-US" smtClean="0"/>
-              <a:t>5/9/2017</a:t>
+              <a:t>5/10/2017</a:t>
             </a:fld>
             <a:endParaRPr lang="en-US"/>
           </a:p>
@@ -2008,7 +2008,7 @@
           <a:p>
             <a:fld id="{EC08704B-88A3-4061-B4A3-57E438D2F1A5}" type="datetimeFigureOut">
               <a:rPr lang="en-US" smtClean="0"/>
-              <a:t>5/9/2017</a:t>
+              <a:t>5/10/2017</a:t>
             </a:fld>
             <a:endParaRPr lang="en-US"/>
           </a:p>
@@ -2425,7 +2425,7 @@
           <a:p>
             <a:fld id="{EC08704B-88A3-4061-B4A3-57E438D2F1A5}" type="datetimeFigureOut">
               <a:rPr lang="en-US" smtClean="0"/>
-              <a:t>5/9/2017</a:t>
+              <a:t>5/10/2017</a:t>
             </a:fld>
             <a:endParaRPr lang="en-US"/>
           </a:p>
@@ -2538,7 +2538,7 @@
           <a:p>
             <a:fld id="{EC08704B-88A3-4061-B4A3-57E438D2F1A5}" type="datetimeFigureOut">
               <a:rPr lang="en-US" smtClean="0"/>
-              <a:t>5/9/2017</a:t>
+              <a:t>5/10/2017</a:t>
             </a:fld>
             <a:endParaRPr lang="en-US"/>
           </a:p>
@@ -2628,7 +2628,7 @@
           <a:p>
             <a:fld id="{EC08704B-88A3-4061-B4A3-57E438D2F1A5}" type="datetimeFigureOut">
               <a:rPr lang="en-US" smtClean="0"/>
-              <a:t>5/9/2017</a:t>
+              <a:t>5/10/2017</a:t>
             </a:fld>
             <a:endParaRPr lang="en-US"/>
           </a:p>
@@ -2900,7 +2900,7 @@
           <a:p>
             <a:fld id="{EC08704B-88A3-4061-B4A3-57E438D2F1A5}" type="datetimeFigureOut">
               <a:rPr lang="en-US" smtClean="0"/>
-              <a:t>5/9/2017</a:t>
+              <a:t>5/10/2017</a:t>
             </a:fld>
             <a:endParaRPr lang="en-US"/>
           </a:p>
@@ -3065,7 +3065,7 @@
           <a:p>
             <a:fld id="{D53C406F-A7E7-47DA-9FE1-6771CEBB572B}" type="datetimeFigureOut">
               <a:rPr lang="en-US" smtClean="0"/>
-              <a:t>5/9/2017</a:t>
+              <a:t>5/10/2017</a:t>
             </a:fld>
             <a:endParaRPr lang="en-US"/>
           </a:p>
@@ -3313,7 +3313,7 @@
           <a:p>
             <a:fld id="{EC08704B-88A3-4061-B4A3-57E438D2F1A5}" type="datetimeFigureOut">
               <a:rPr lang="en-US" smtClean="0"/>
-              <a:t>5/9/2017</a:t>
+              <a:t>5/10/2017</a:t>
             </a:fld>
             <a:endParaRPr lang="en-US"/>
           </a:p>
@@ -3478,7 +3478,7 @@
           <a:p>
             <a:fld id="{EC08704B-88A3-4061-B4A3-57E438D2F1A5}" type="datetimeFigureOut">
               <a:rPr lang="en-US" smtClean="0"/>
-              <a:t>5/9/2017</a:t>
+              <a:t>5/10/2017</a:t>
             </a:fld>
             <a:endParaRPr lang="en-US"/>
           </a:p>
@@ -3653,7 +3653,7 @@
           <a:p>
             <a:fld id="{EC08704B-88A3-4061-B4A3-57E438D2F1A5}" type="datetimeFigureOut">
               <a:rPr lang="en-US" smtClean="0"/>
-              <a:t>5/9/2017</a:t>
+              <a:t>5/10/2017</a:t>
             </a:fld>
             <a:endParaRPr lang="en-US"/>
           </a:p>
@@ -3894,7 +3894,7 @@
           <a:p>
             <a:fld id="{D53C406F-A7E7-47DA-9FE1-6771CEBB572B}" type="datetimeFigureOut">
               <a:rPr lang="en-US" smtClean="0"/>
-              <a:t>5/9/2017</a:t>
+              <a:t>5/10/2017</a:t>
             </a:fld>
             <a:endParaRPr lang="en-US"/>
           </a:p>
@@ -4177,7 +4177,7 @@
           <a:p>
             <a:fld id="{D53C406F-A7E7-47DA-9FE1-6771CEBB572B}" type="datetimeFigureOut">
               <a:rPr lang="en-US" smtClean="0"/>
-              <a:t>5/9/2017</a:t>
+              <a:t>5/10/2017</a:t>
             </a:fld>
             <a:endParaRPr lang="en-US"/>
           </a:p>
@@ -4594,7 +4594,7 @@
           <a:p>
             <a:fld id="{D53C406F-A7E7-47DA-9FE1-6771CEBB572B}" type="datetimeFigureOut">
               <a:rPr lang="en-US" smtClean="0"/>
-              <a:t>5/9/2017</a:t>
+              <a:t>5/10/2017</a:t>
             </a:fld>
             <a:endParaRPr lang="en-US"/>
           </a:p>
@@ -4707,7 +4707,7 @@
           <a:p>
             <a:fld id="{D53C406F-A7E7-47DA-9FE1-6771CEBB572B}" type="datetimeFigureOut">
               <a:rPr lang="en-US" smtClean="0"/>
-              <a:t>5/9/2017</a:t>
+              <a:t>5/10/2017</a:t>
             </a:fld>
             <a:endParaRPr lang="en-US"/>
           </a:p>
@@ -4797,7 +4797,7 @@
           <a:p>
             <a:fld id="{D53C406F-A7E7-47DA-9FE1-6771CEBB572B}" type="datetimeFigureOut">
               <a:rPr lang="en-US" smtClean="0"/>
-              <a:t>5/9/2017</a:t>
+              <a:t>5/10/2017</a:t>
             </a:fld>
             <a:endParaRPr lang="en-US"/>
           </a:p>
@@ -5069,7 +5069,7 @@
           <a:p>
             <a:fld id="{D53C406F-A7E7-47DA-9FE1-6771CEBB572B}" type="datetimeFigureOut">
               <a:rPr lang="en-US" smtClean="0"/>
-              <a:t>5/9/2017</a:t>
+              <a:t>5/10/2017</a:t>
             </a:fld>
             <a:endParaRPr lang="en-US"/>
           </a:p>
@@ -5321,7 +5321,7 @@
           <a:p>
             <a:fld id="{D53C406F-A7E7-47DA-9FE1-6771CEBB572B}" type="datetimeFigureOut">
               <a:rPr lang="en-US" smtClean="0"/>
-              <a:t>5/9/2017</a:t>
+              <a:t>5/10/2017</a:t>
             </a:fld>
             <a:endParaRPr lang="en-US"/>
           </a:p>
@@ -5532,7 +5532,7 @@
             <a:fld id="{D53C406F-A7E7-47DA-9FE1-6771CEBB572B}" type="datetimeFigureOut">
               <a:rPr lang="en-US" smtClean="0"/>
               <a:pPr/>
-              <a:t>5/9/2017</a:t>
+              <a:t>5/10/2017</a:t>
             </a:fld>
             <a:endParaRPr lang="en-US"/>
           </a:p>
@@ -6042,7 +6042,7 @@
           <a:p>
             <a:fld id="{EC08704B-88A3-4061-B4A3-57E438D2F1A5}" type="datetimeFigureOut">
               <a:rPr lang="en-US" smtClean="0"/>
-              <a:t>5/9/2017</a:t>
+              <a:t>5/10/2017</a:t>
             </a:fld>
             <a:endParaRPr lang="en-US"/>
           </a:p>
@@ -6519,37 +6519,46 @@
           <a:lstStyle/>
           <a:p>
             <a:r>
-              <a:rPr lang="en-US" sz="1100" dirty="0" smtClean="0"/>
+              <a:rPr lang="en-US" sz="1000" dirty="0" smtClean="0"/>
               <a:t>Project Website:</a:t>
             </a:r>
           </a:p>
           <a:p>
             <a:r>
-              <a:rPr lang="en-US" sz="1100" dirty="0" smtClean="0">
+              <a:rPr lang="en-US" sz="800" dirty="0" smtClean="0">
                 <a:hlinkClick r:id="rId4"/>
               </a:rPr>
               <a:t>sites.lafayette.edu/ece492-sp17</a:t>
             </a:r>
-            <a:endParaRPr lang="en-US" sz="1100" dirty="0" smtClean="0"/>
-          </a:p>
-          <a:p>
-            <a:r>
-              <a:rPr lang="en-US" sz="1100" dirty="0" smtClean="0"/>
-              <a:t>Engineers: Jack Plumb, Adam Ness, </a:t>
-            </a:r>
-            <a:r>
-              <a:rPr lang="en-US" sz="1100" dirty="0" err="1" smtClean="0"/>
+            <a:endParaRPr lang="en-US" sz="800" dirty="0" smtClean="0"/>
+          </a:p>
+          <a:p>
+            <a:endParaRPr lang="en-US" sz="800" dirty="0" smtClean="0"/>
+          </a:p>
+          <a:p>
+            <a:r>
+              <a:rPr lang="en-US" sz="1000" dirty="0" smtClean="0"/>
+              <a:t>Engineers: </a:t>
+            </a:r>
+          </a:p>
+          <a:p>
+            <a:r>
+              <a:rPr lang="en-US" sz="800" dirty="0" smtClean="0"/>
+              <a:t>Jack Plumb, Adam Ness, </a:t>
+            </a:r>
+            <a:r>
+              <a:rPr lang="en-US" sz="800" dirty="0" err="1" smtClean="0"/>
               <a:t>Christer</a:t>
             </a:r>
             <a:r>
-              <a:rPr lang="en-US" sz="1100" dirty="0" smtClean="0"/>
+              <a:rPr lang="en-US" sz="800" dirty="0" smtClean="0"/>
               <a:t> </a:t>
             </a:r>
             <a:r>
-              <a:rPr lang="en-US" sz="1100" dirty="0" err="1" smtClean="0"/>
+              <a:rPr lang="en-US" sz="800" dirty="0" err="1" smtClean="0"/>
               <a:t>Hoeflinger</a:t>
             </a:r>
-            <a:endParaRPr lang="en-US" sz="1100" dirty="0" smtClean="0"/>
+            <a:endParaRPr lang="en-US" sz="800" dirty="0" smtClean="0"/>
           </a:p>
           <a:p>
             <a:endParaRPr lang="en-US" sz="1100" dirty="0"/>
@@ -6793,8 +6802,8 @@
         </p:nvSpPr>
         <p:spPr>
           <a:xfrm>
-            <a:off x="2605948" y="3581400"/>
-            <a:ext cx="3642452" cy="1661993"/>
+            <a:off x="2665948" y="3585969"/>
+            <a:ext cx="1807768" cy="1631216"/>
           </a:xfrm>
           <a:prstGeom prst="rect">
             <a:avLst/>
@@ -6810,34 +6819,84 @@
             <a:pPr algn="just"/>
             <a:r>
               <a:rPr lang="en-US" sz="1200" dirty="0" smtClean="0"/>
-              <a:t>Testing and </a:t>
-            </a:r>
-            <a:r>
-              <a:rPr lang="en-US" sz="1200" dirty="0" smtClean="0"/>
-              <a:t>Integration</a:t>
-            </a:r>
+              <a:t>Testing</a:t>
+            </a:r>
+            <a:endParaRPr lang="en-US" sz="1200" dirty="0" smtClean="0"/>
           </a:p>
           <a:p>
             <a:pPr algn="just"/>
             <a:endParaRPr lang="en-US" sz="800" dirty="0"/>
           </a:p>
           <a:p>
-            <a:pPr algn="just"/>
+            <a:pPr marL="171450" indent="-171450">
+              <a:buFont typeface="Arial" panose="020B0604020202020204" pitchFamily="34" charset="0"/>
+              <a:buChar char="•"/>
+            </a:pPr>
             <a:r>
               <a:rPr lang="en-US" sz="800" dirty="0" smtClean="0"/>
-              <a:t>Testing of the TSI subsystem largely revolved around functionality of the board. At the completion of this semester, many of the designed abilities of the board remain unimplemented. As the semester progressed, efforts were directed towards drive-critical components of the subsystem, so that a functional car could be realized.</a:t>
-            </a:r>
-          </a:p>
-          <a:p>
-            <a:pPr algn="just"/>
+              <a:t>Testing focused on functionality </a:t>
+            </a:r>
+            <a:r>
+              <a:rPr lang="en-US" sz="800" dirty="0" smtClean="0"/>
+              <a:t>of the board. </a:t>
+            </a:r>
             <a:endParaRPr lang="en-US" sz="800" dirty="0"/>
           </a:p>
           <a:p>
-            <a:pPr algn="just"/>
+            <a:pPr marL="171450" indent="-171450">
+              <a:buFont typeface="Arial" panose="020B0604020202020204" pitchFamily="34" charset="0"/>
+              <a:buChar char="•"/>
+            </a:pPr>
+            <a:r>
+              <a:rPr lang="en-US" sz="800" dirty="0"/>
+              <a:t>T</a:t>
+            </a:r>
             <a:r>
               <a:rPr lang="en-US" sz="800" dirty="0" smtClean="0"/>
-              <a:t>Figure 5 (left) shows the test panel that was built to test the subsystem’s driver interface prior to integration. This was able to simulate the two throttle potentiometers, allowing for throttle plausibility checks, as well as brake press and over-travel. These signals were used to confirm drive state operability.</a:t>
-            </a:r>
+              <a:t>est panel (Fig. 5) simulates subsystem’s </a:t>
+            </a:r>
+            <a:r>
+              <a:rPr lang="en-US" sz="800" dirty="0" smtClean="0"/>
+              <a:t>driver </a:t>
+            </a:r>
+            <a:r>
+              <a:rPr lang="en-US" sz="800" dirty="0" smtClean="0"/>
+              <a:t>interface </a:t>
+            </a:r>
+          </a:p>
+          <a:p>
+            <a:pPr marL="171450" indent="-171450">
+              <a:buFont typeface="Arial" panose="020B0604020202020204" pitchFamily="34" charset="0"/>
+              <a:buChar char="•"/>
+            </a:pPr>
+            <a:r>
+              <a:rPr lang="en-US" sz="800" dirty="0" smtClean="0"/>
+              <a:t>Able </a:t>
+            </a:r>
+            <a:r>
+              <a:rPr lang="en-US" sz="800" dirty="0" smtClean="0"/>
+              <a:t>to simulate </a:t>
+            </a:r>
+            <a:r>
+              <a:rPr lang="en-US" sz="800" dirty="0" smtClean="0"/>
+              <a:t>throttle </a:t>
+            </a:r>
+            <a:r>
+              <a:rPr lang="en-US" sz="800" dirty="0" smtClean="0"/>
+              <a:t>plausibility checks, as well as brake press and over-travel. </a:t>
+            </a:r>
+            <a:endParaRPr lang="en-US" sz="800" dirty="0" smtClean="0"/>
+          </a:p>
+          <a:p>
+            <a:pPr marL="171450" indent="-171450">
+              <a:buFont typeface="Arial" panose="020B0604020202020204" pitchFamily="34" charset="0"/>
+              <a:buChar char="•"/>
+            </a:pPr>
+            <a:r>
+              <a:rPr lang="en-US" sz="800" dirty="0" smtClean="0"/>
+              <a:t>Used to confirm drive state operability</a:t>
+            </a:r>
+            <a:endParaRPr lang="en-US" sz="800" dirty="0" smtClean="0"/>
           </a:p>
           <a:p>
             <a:pPr algn="just"/>
@@ -6917,24 +6976,68 @@
               <a:rPr lang="en-US" sz="1200" dirty="0" smtClean="0"/>
               <a:t>TSI Board</a:t>
             </a:r>
-            <a:endParaRPr lang="en-US" sz="1200" dirty="0" smtClean="0"/>
           </a:p>
           <a:p>
             <a:endParaRPr lang="en-US" sz="800" dirty="0" smtClean="0"/>
           </a:p>
           <a:p>
-            <a:pPr algn="dist"/>
+            <a:pPr marL="171450" indent="-171450">
+              <a:buFont typeface="Arial" panose="020B0604020202020204" pitchFamily="34" charset="0"/>
+              <a:buChar char="•"/>
+            </a:pPr>
             <a:r>
               <a:rPr lang="en-US" sz="800" dirty="0" smtClean="0"/>
-              <a:t>All logical control of the TSI subsystem was processed by the PCB. This included monitoring of throttle, brake, and driver input, to determine appropriate drive state and action. </a:t>
-            </a:r>
-            <a:r>
-              <a:rPr lang="en-US" sz="800" dirty="0"/>
-              <a:t>T</a:t>
-            </a:r>
+              <a:t>Responsible for all logical control of subsystem</a:t>
+            </a:r>
+          </a:p>
+          <a:p>
+            <a:pPr marL="171450" indent="-171450">
+              <a:buFont typeface="Arial" panose="020B0604020202020204" pitchFamily="34" charset="0"/>
+              <a:buChar char="•"/>
+            </a:pPr>
             <a:r>
               <a:rPr lang="en-US" sz="800" dirty="0" smtClean="0"/>
-              <a:t>he board is capable of interfacing with VSCADA to send observed data, as well as the reception and transmission of remote throttle control to the motor controller. Additionally, various status lights and signals are controlled by the board.</a:t>
+              <a:t>Monitored throttle, brake, and driver input to determine drive state and action</a:t>
+            </a:r>
+          </a:p>
+          <a:p>
+            <a:pPr marL="171450" indent="-171450">
+              <a:buFont typeface="Arial" panose="020B0604020202020204" pitchFamily="34" charset="0"/>
+              <a:buChar char="•"/>
+            </a:pPr>
+            <a:r>
+              <a:rPr lang="en-US" sz="800" dirty="0" smtClean="0"/>
+              <a:t>Capable of interfacing with VSCADA</a:t>
+            </a:r>
+          </a:p>
+          <a:p>
+            <a:pPr marL="628650" lvl="1" indent="-171450">
+              <a:buFont typeface="Arial" panose="020B0604020202020204" pitchFamily="34" charset="0"/>
+              <a:buChar char="•"/>
+            </a:pPr>
+            <a:r>
+              <a:rPr lang="en-US" sz="800" dirty="0" smtClean="0"/>
+              <a:t>Send observed data</a:t>
+            </a:r>
+          </a:p>
+          <a:p>
+            <a:pPr marL="628650" lvl="1" indent="-171450">
+              <a:buFont typeface="Arial" panose="020B0604020202020204" pitchFamily="34" charset="0"/>
+              <a:buChar char="•"/>
+            </a:pPr>
+            <a:r>
+              <a:rPr lang="en-US" sz="800" dirty="0" smtClean="0"/>
+              <a:t>Reception and transmission of remote throttle control</a:t>
+            </a:r>
+          </a:p>
+          <a:p>
+            <a:pPr marL="171450" indent="-171450">
+              <a:buFont typeface="Arial" panose="020B0604020202020204" pitchFamily="34" charset="0"/>
+              <a:buChar char="•"/>
+            </a:pPr>
+            <a:r>
+              <a:rPr lang="en-US" sz="800" dirty="0" smtClean="0"/>
+              <a:t>Control of status lights </a:t>
             </a:r>
             <a:endParaRPr lang="en-US" sz="800" dirty="0"/>
           </a:p>
@@ -6995,7 +7098,7 @@
         <p:spPr>
           <a:xfrm>
             <a:off x="6506693" y="5543862"/>
-            <a:ext cx="1729173" cy="1046440"/>
+            <a:ext cx="1729173" cy="1015663"/>
           </a:xfrm>
           <a:prstGeom prst="rect">
             <a:avLst/>
@@ -7028,7 +7131,7 @@
             </a:r>
             <a:r>
               <a:rPr lang="en-US" sz="800" dirty="0" smtClean="0"/>
-              <a:t>, and Adam Smith for helping with the build of our many components. Also thank you to the entire Mechanical Engineering team.</a:t>
+              <a:t>, and Adam Smith for helping build our many components. Also thank you to the entire Mechanical Engineering team.</a:t>
             </a:r>
             <a:endParaRPr lang="en-US" sz="800" dirty="0"/>
           </a:p>
@@ -7239,8 +7342,8 @@
         </p:blipFill>
         <p:spPr>
           <a:xfrm>
-            <a:off x="2699545" y="5975722"/>
-            <a:ext cx="1940476" cy="432356"/>
+            <a:off x="4672090" y="4166723"/>
+            <a:ext cx="1643642" cy="366218"/>
           </a:xfrm>
           <a:prstGeom prst="rect">
             <a:avLst/>
@@ -7268,7 +7371,7 @@
         </p:blipFill>
         <p:spPr>
           <a:xfrm>
-            <a:off x="431358" y="5272372"/>
+            <a:off x="530464" y="5287450"/>
             <a:ext cx="1557958" cy="1135706"/>
           </a:xfrm>
           <a:prstGeom prst="rect">
@@ -7360,7 +7463,7 @@
         </p:nvSpPr>
         <p:spPr>
           <a:xfrm>
-            <a:off x="6524623" y="3831850"/>
+            <a:off x="6539644" y="3878720"/>
             <a:ext cx="2353953" cy="1015663"/>
           </a:xfrm>
           <a:prstGeom prst="rect">
@@ -7376,11 +7479,7 @@
           <a:p>
             <a:r>
               <a:rPr lang="en-US" sz="1200" dirty="0" smtClean="0"/>
-              <a:t>The </a:t>
-            </a:r>
-            <a:r>
-              <a:rPr lang="en-US" sz="1200" dirty="0" smtClean="0"/>
-              <a:t>Team</a:t>
+              <a:t>The Team</a:t>
             </a:r>
           </a:p>
           <a:p>
@@ -7444,7 +7543,7 @@
         <p:spPr>
           <a:xfrm>
             <a:off x="6609171" y="1184483"/>
-            <a:ext cx="2353953" cy="1169551"/>
+            <a:ext cx="2353953" cy="1015663"/>
           </a:xfrm>
           <a:prstGeom prst="rect">
             <a:avLst/>
@@ -7466,11 +7565,52 @@
             <a:endParaRPr lang="en-US" sz="800" dirty="0" smtClean="0"/>
           </a:p>
           <a:p>
-            <a:pPr algn="just"/>
+            <a:pPr marL="171450" indent="-171450" algn="just">
+              <a:buFont typeface="Arial" panose="020B0604020202020204" pitchFamily="34" charset="0"/>
+              <a:buChar char="•"/>
+            </a:pPr>
             <a:r>
               <a:rPr lang="en-US" sz="800" dirty="0" smtClean="0"/>
-              <a:t>The TSI Enclosure was designed to neatly house all systems needed to safely operate the vehicle. Electric insulation was needed to protect the parts from the metal walls. Panels were fabricated separately to allow for adaptability if new ports were needed.</a:t>
-            </a:r>
+              <a:t>Enclosure designed </a:t>
+            </a:r>
+            <a:r>
+              <a:rPr lang="en-US" sz="800" dirty="0" smtClean="0"/>
+              <a:t>to neatly house </a:t>
+            </a:r>
+            <a:r>
+              <a:rPr lang="en-US" sz="800" dirty="0" smtClean="0"/>
+              <a:t>entire subsystem</a:t>
+            </a:r>
+          </a:p>
+          <a:p>
+            <a:pPr marL="171450" indent="-171450" algn="just">
+              <a:buFont typeface="Arial" panose="020B0604020202020204" pitchFamily="34" charset="0"/>
+              <a:buChar char="•"/>
+            </a:pPr>
+            <a:r>
+              <a:rPr lang="en-US" sz="800" dirty="0" smtClean="0"/>
+              <a:t>Electric </a:t>
+            </a:r>
+            <a:r>
+              <a:rPr lang="en-US" sz="800" dirty="0" smtClean="0"/>
+              <a:t>insulation </a:t>
+            </a:r>
+            <a:r>
+              <a:rPr lang="en-US" sz="800" dirty="0" smtClean="0"/>
+              <a:t>necessary to ensure safe operation</a:t>
+            </a:r>
+            <a:endParaRPr lang="en-US" sz="800" dirty="0" smtClean="0"/>
+          </a:p>
+          <a:p>
+            <a:pPr marL="171450" indent="-171450" algn="just">
+              <a:buFont typeface="Arial" panose="020B0604020202020204" pitchFamily="34" charset="0"/>
+              <a:buChar char="•"/>
+            </a:pPr>
+            <a:r>
+              <a:rPr lang="en-US" sz="800" dirty="0" smtClean="0"/>
+              <a:t>Panels fabricated to allow for changes to design</a:t>
+            </a:r>
+            <a:endParaRPr lang="en-US" sz="800" dirty="0" smtClean="0"/>
           </a:p>
         </p:txBody>
       </p:sp>
@@ -7730,8 +7870,8 @@
         </p:blipFill>
         <p:spPr>
           <a:xfrm>
-            <a:off x="4870844" y="5248502"/>
-            <a:ext cx="1260772" cy="945580"/>
+            <a:off x="4688659" y="4980676"/>
+            <a:ext cx="1615600" cy="1211702"/>
           </a:xfrm>
           <a:prstGeom prst="rect">
             <a:avLst/>
@@ -7874,7 +8014,7 @@
         </p:nvSpPr>
         <p:spPr>
           <a:xfrm>
-            <a:off x="2914223" y="6409778"/>
+            <a:off x="4731727" y="4558114"/>
             <a:ext cx="1529464" cy="184666"/>
           </a:xfrm>
           <a:prstGeom prst="rect">
@@ -7904,7 +8044,7 @@
         </p:nvSpPr>
         <p:spPr>
           <a:xfrm>
-            <a:off x="4890952" y="6261019"/>
+            <a:off x="4934519" y="6268562"/>
             <a:ext cx="1123880" cy="184666"/>
           </a:xfrm>
           <a:prstGeom prst="rect">
@@ -7923,40 +8063,6 @@
               <a:t>Fig. 6: TSI integrated into car</a:t>
             </a:r>
             <a:endParaRPr lang="en-US" sz="600" dirty="0"/>
-          </a:p>
-        </p:txBody>
-      </p:sp>
-      <p:sp>
-        <p:nvSpPr>
-          <p:cNvPr id="36" name="TextBox 35"/>
-          <p:cNvSpPr txBox="1"/>
-          <p:nvPr/>
-        </p:nvSpPr>
-        <p:spPr>
-          <a:xfrm>
-            <a:off x="2603850" y="5085358"/>
-            <a:ext cx="2150210" cy="984885"/>
-          </a:xfrm>
-          <a:prstGeom prst="rect">
-            <a:avLst/>
-          </a:prstGeom>
-          <a:noFill/>
-        </p:spPr>
-        <p:txBody>
-          <a:bodyPr wrap="square" rtlCol="0">
-            <a:spAutoFit/>
-          </a:bodyPr>
-          <a:lstStyle/>
-          <a:p>
-            <a:pPr algn="just"/>
-            <a:r>
-              <a:rPr lang="en-US" sz="800" dirty="0"/>
-              <a:t>Figure 6 (right) is the fully integrated subsystem mounted on the car. Here you can see the high voltage connections entering and leaving the enclosure, as well as the motor controller connections.</a:t>
-            </a:r>
-          </a:p>
-          <a:p>
-            <a:pPr algn="just"/>
-            <a:endParaRPr lang="en-US" dirty="0"/>
           </a:p>
         </p:txBody>
       </p:sp>
@@ -7990,6 +8096,51 @@
           </a:prstGeom>
         </p:spPr>
       </p:pic>
+      <p:sp>
+        <p:nvSpPr>
+          <p:cNvPr id="40" name="TextBox 39"/>
+          <p:cNvSpPr txBox="1"/>
+          <p:nvPr/>
+        </p:nvSpPr>
+        <p:spPr>
+          <a:xfrm>
+            <a:off x="2660452" y="5349117"/>
+            <a:ext cx="1807768" cy="892552"/>
+          </a:xfrm>
+          <a:prstGeom prst="rect">
+            <a:avLst/>
+          </a:prstGeom>
+          <a:noFill/>
+        </p:spPr>
+        <p:txBody>
+          <a:bodyPr wrap="square" rtlCol="0">
+            <a:spAutoFit/>
+          </a:bodyPr>
+          <a:lstStyle/>
+          <a:p>
+            <a:r>
+              <a:rPr lang="en-US" sz="1200" dirty="0" smtClean="0"/>
+              <a:t>Integration</a:t>
+            </a:r>
+            <a:endParaRPr lang="en-US" sz="1200" dirty="0" smtClean="0"/>
+          </a:p>
+          <a:p>
+            <a:endParaRPr lang="en-US" sz="800" dirty="0"/>
+          </a:p>
+          <a:p>
+            <a:pPr algn="just"/>
+            <a:r>
+              <a:rPr lang="en-US" sz="800" dirty="0" smtClean="0"/>
+              <a:t>The TSI subsystem was integrated into the car, successfully implementing drive-critical functionality.</a:t>
+            </a:r>
+            <a:endParaRPr lang="en-US" sz="800" dirty="0" smtClean="0"/>
+          </a:p>
+          <a:p>
+            <a:pPr algn="just"/>
+            <a:endParaRPr lang="en-US" sz="800" dirty="0"/>
+          </a:p>
+        </p:txBody>
+      </p:sp>
     </p:spTree>
   </p:cSld>
   <p:clrMapOvr>

</xml_diff>